<commit_message>
1. PPT SummaryButton 리뷰 목표 추가 2. SummaryButton     - Data Inner Class 추가     - Dependency Property 수정 및 Binding
</commit_message>
<xml_diff>
--- a/docs/매입_매출_design.pptx
+++ b/docs/매입_매출_design.pptx
@@ -4,11 +4,15 @@
   <p:sldMasterIdLst>
     <p:sldMasterId id="2147483648" r:id="rId1"/>
   </p:sldMasterIdLst>
+  <p:notesMasterIdLst>
+    <p:notesMasterId r:id="rId7"/>
+  </p:notesMasterIdLst>
   <p:sldIdLst>
     <p:sldId id="256" r:id="rId2"/>
     <p:sldId id="257" r:id="rId3"/>
     <p:sldId id="258" r:id="rId4"/>
-    <p:sldId id="259" r:id="rId5"/>
+    <p:sldId id="260" r:id="rId5"/>
+    <p:sldId id="259" r:id="rId6"/>
   </p:sldIdLst>
   <p:sldSz cx="9144000" cy="6858000" type="screen4x3"/>
   <p:notesSz cx="6858000" cy="9144000"/>
@@ -110,6 +114,353 @@
 </p:presentation>
 </file>
 
+<file path=ppt/notesMasters/notesMaster1.xml><?xml version="1.0" encoding="utf-8"?>
+<p:notesMaster xmlns:a="http://schemas.openxmlformats.org/drawingml/2006/main" xmlns:r="http://schemas.openxmlformats.org/officeDocument/2006/relationships" xmlns:p="http://schemas.openxmlformats.org/presentationml/2006/main">
+  <p:cSld>
+    <p:bg>
+      <p:bgRef idx="1001">
+        <a:schemeClr val="bg1"/>
+      </p:bgRef>
+    </p:bg>
+    <p:spTree>
+      <p:nvGrpSpPr>
+        <p:cNvPr id="1" name=""/>
+        <p:cNvGrpSpPr/>
+        <p:nvPr/>
+      </p:nvGrpSpPr>
+      <p:grpSpPr>
+        <a:xfrm>
+          <a:off x="0" y="0"/>
+          <a:ext cx="0" cy="0"/>
+          <a:chOff x="0" y="0"/>
+          <a:chExt cx="0" cy="0"/>
+        </a:xfrm>
+      </p:grpSpPr>
+      <p:sp>
+        <p:nvSpPr>
+          <p:cNvPr id="2" name="머리글 개체 틀 1"/>
+          <p:cNvSpPr>
+            <a:spLocks noGrp="1"/>
+          </p:cNvSpPr>
+          <p:nvPr>
+            <p:ph type="hdr" sz="quarter"/>
+          </p:nvPr>
+        </p:nvSpPr>
+        <p:spPr>
+          <a:xfrm>
+            <a:off x="0" y="0"/>
+            <a:ext cx="2971800" cy="457200"/>
+          </a:xfrm>
+          <a:prstGeom prst="rect">
+            <a:avLst/>
+          </a:prstGeom>
+        </p:spPr>
+        <p:txBody>
+          <a:bodyPr vert="horz" lIns="91440" tIns="45720" rIns="91440" bIns="45720" rtlCol="0"/>
+          <a:lstStyle>
+            <a:lvl1pPr algn="l">
+              <a:defRPr sz="1200"/>
+            </a:lvl1pPr>
+          </a:lstStyle>
+          <a:p>
+            <a:endParaRPr lang="ko-KR" altLang="en-US"/>
+          </a:p>
+        </p:txBody>
+      </p:sp>
+      <p:sp>
+        <p:nvSpPr>
+          <p:cNvPr id="3" name="날짜 개체 틀 2"/>
+          <p:cNvSpPr>
+            <a:spLocks noGrp="1"/>
+          </p:cNvSpPr>
+          <p:nvPr>
+            <p:ph type="dt" idx="1"/>
+          </p:nvPr>
+        </p:nvSpPr>
+        <p:spPr>
+          <a:xfrm>
+            <a:off x="3884613" y="0"/>
+            <a:ext cx="2971800" cy="457200"/>
+          </a:xfrm>
+          <a:prstGeom prst="rect">
+            <a:avLst/>
+          </a:prstGeom>
+        </p:spPr>
+        <p:txBody>
+          <a:bodyPr vert="horz" lIns="91440" tIns="45720" rIns="91440" bIns="45720" rtlCol="0"/>
+          <a:lstStyle>
+            <a:lvl1pPr algn="r">
+              <a:defRPr sz="1200"/>
+            </a:lvl1pPr>
+          </a:lstStyle>
+          <a:p>
+            <a:fld id="{F525D05C-1EE2-428C-83E5-557712FD8B83}" type="datetimeFigureOut">
+              <a:rPr lang="ko-KR" altLang="en-US" smtClean="0"/>
+              <a:t>2019-01-13</a:t>
+            </a:fld>
+            <a:endParaRPr lang="ko-KR" altLang="en-US"/>
+          </a:p>
+        </p:txBody>
+      </p:sp>
+      <p:sp>
+        <p:nvSpPr>
+          <p:cNvPr id="4" name="슬라이드 이미지 개체 틀 3"/>
+          <p:cNvSpPr>
+            <a:spLocks noGrp="1" noRot="1" noChangeAspect="1"/>
+          </p:cNvSpPr>
+          <p:nvPr>
+            <p:ph type="sldImg" idx="2"/>
+          </p:nvPr>
+        </p:nvSpPr>
+        <p:spPr>
+          <a:xfrm>
+            <a:off x="1143000" y="685800"/>
+            <a:ext cx="4572000" cy="3429000"/>
+          </a:xfrm>
+          <a:prstGeom prst="rect">
+            <a:avLst/>
+          </a:prstGeom>
+          <a:noFill/>
+          <a:ln w="12700">
+            <a:solidFill>
+              <a:prstClr val="black"/>
+            </a:solidFill>
+          </a:ln>
+        </p:spPr>
+        <p:txBody>
+          <a:bodyPr vert="horz" lIns="91440" tIns="45720" rIns="91440" bIns="45720" rtlCol="0" anchor="ctr"/>
+          <a:lstStyle/>
+          <a:p>
+            <a:endParaRPr lang="ko-KR" altLang="en-US"/>
+          </a:p>
+        </p:txBody>
+      </p:sp>
+      <p:sp>
+        <p:nvSpPr>
+          <p:cNvPr id="5" name="슬라이드 노트 개체 틀 4"/>
+          <p:cNvSpPr>
+            <a:spLocks noGrp="1"/>
+          </p:cNvSpPr>
+          <p:nvPr>
+            <p:ph type="body" sz="quarter" idx="3"/>
+          </p:nvPr>
+        </p:nvSpPr>
+        <p:spPr>
+          <a:xfrm>
+            <a:off x="685800" y="4343400"/>
+            <a:ext cx="5486400" cy="4114800"/>
+          </a:xfrm>
+          <a:prstGeom prst="rect">
+            <a:avLst/>
+          </a:prstGeom>
+        </p:spPr>
+        <p:txBody>
+          <a:bodyPr vert="horz" lIns="91440" tIns="45720" rIns="91440" bIns="45720" rtlCol="0">
+            <a:normAutofit/>
+          </a:bodyPr>
+          <a:lstStyle/>
+          <a:p>
+            <a:pPr lvl="0"/>
+            <a:r>
+              <a:rPr lang="ko-KR" altLang="en-US" smtClean="0"/>
+              <a:t>마스터 텍스트 스타일을 편집합니다</a:t>
+            </a:r>
+          </a:p>
+          <a:p>
+            <a:pPr lvl="1"/>
+            <a:r>
+              <a:rPr lang="ko-KR" altLang="en-US" smtClean="0"/>
+              <a:t>둘째 수준</a:t>
+            </a:r>
+          </a:p>
+          <a:p>
+            <a:pPr lvl="2"/>
+            <a:r>
+              <a:rPr lang="ko-KR" altLang="en-US" smtClean="0"/>
+              <a:t>셋째 수준</a:t>
+            </a:r>
+          </a:p>
+          <a:p>
+            <a:pPr lvl="3"/>
+            <a:r>
+              <a:rPr lang="ko-KR" altLang="en-US" smtClean="0"/>
+              <a:t>넷째 수준</a:t>
+            </a:r>
+          </a:p>
+          <a:p>
+            <a:pPr lvl="4"/>
+            <a:r>
+              <a:rPr lang="ko-KR" altLang="en-US" smtClean="0"/>
+              <a:t>다섯째 수준</a:t>
+            </a:r>
+            <a:endParaRPr lang="ko-KR" altLang="en-US"/>
+          </a:p>
+        </p:txBody>
+      </p:sp>
+      <p:sp>
+        <p:nvSpPr>
+          <p:cNvPr id="6" name="바닥글 개체 틀 5"/>
+          <p:cNvSpPr>
+            <a:spLocks noGrp="1"/>
+          </p:cNvSpPr>
+          <p:nvPr>
+            <p:ph type="ftr" sz="quarter" idx="4"/>
+          </p:nvPr>
+        </p:nvSpPr>
+        <p:spPr>
+          <a:xfrm>
+            <a:off x="0" y="8685213"/>
+            <a:ext cx="2971800" cy="457200"/>
+          </a:xfrm>
+          <a:prstGeom prst="rect">
+            <a:avLst/>
+          </a:prstGeom>
+        </p:spPr>
+        <p:txBody>
+          <a:bodyPr vert="horz" lIns="91440" tIns="45720" rIns="91440" bIns="45720" rtlCol="0" anchor="b"/>
+          <a:lstStyle>
+            <a:lvl1pPr algn="l">
+              <a:defRPr sz="1200"/>
+            </a:lvl1pPr>
+          </a:lstStyle>
+          <a:p>
+            <a:endParaRPr lang="ko-KR" altLang="en-US"/>
+          </a:p>
+        </p:txBody>
+      </p:sp>
+      <p:sp>
+        <p:nvSpPr>
+          <p:cNvPr id="7" name="슬라이드 번호 개체 틀 6"/>
+          <p:cNvSpPr>
+            <a:spLocks noGrp="1"/>
+          </p:cNvSpPr>
+          <p:nvPr>
+            <p:ph type="sldNum" sz="quarter" idx="5"/>
+          </p:nvPr>
+        </p:nvSpPr>
+        <p:spPr>
+          <a:xfrm>
+            <a:off x="3884613" y="8685213"/>
+            <a:ext cx="2971800" cy="457200"/>
+          </a:xfrm>
+          <a:prstGeom prst="rect">
+            <a:avLst/>
+          </a:prstGeom>
+        </p:spPr>
+        <p:txBody>
+          <a:bodyPr vert="horz" lIns="91440" tIns="45720" rIns="91440" bIns="45720" rtlCol="0" anchor="b"/>
+          <a:lstStyle>
+            <a:lvl1pPr algn="r">
+              <a:defRPr sz="1200"/>
+            </a:lvl1pPr>
+          </a:lstStyle>
+          <a:p>
+            <a:fld id="{E264924C-2D03-46B9-8069-59C0C47FC1E5}" type="slidenum">
+              <a:rPr lang="ko-KR" altLang="en-US" smtClean="0"/>
+              <a:t>‹#›</a:t>
+            </a:fld>
+            <a:endParaRPr lang="ko-KR" altLang="en-US"/>
+          </a:p>
+        </p:txBody>
+      </p:sp>
+    </p:spTree>
+  </p:cSld>
+  <p:clrMap bg1="lt1" tx1="dk1" bg2="lt2" tx2="dk2" accent1="accent1" accent2="accent2" accent3="accent3" accent4="accent4" accent5="accent5" accent6="accent6" hlink="hlink" folHlink="folHlink"/>
+  <p:notesStyle>
+    <a:lvl1pPr marL="0" algn="l" defTabSz="914400" rtl="0" eaLnBrk="1" latinLnBrk="1" hangingPunct="1">
+      <a:defRPr sz="1200" kern="1200">
+        <a:solidFill>
+          <a:schemeClr val="tx1"/>
+        </a:solidFill>
+        <a:latin typeface="+mn-lt"/>
+        <a:ea typeface="+mn-ea"/>
+        <a:cs typeface="+mn-cs"/>
+      </a:defRPr>
+    </a:lvl1pPr>
+    <a:lvl2pPr marL="457200" algn="l" defTabSz="914400" rtl="0" eaLnBrk="1" latinLnBrk="1" hangingPunct="1">
+      <a:defRPr sz="1200" kern="1200">
+        <a:solidFill>
+          <a:schemeClr val="tx1"/>
+        </a:solidFill>
+        <a:latin typeface="+mn-lt"/>
+        <a:ea typeface="+mn-ea"/>
+        <a:cs typeface="+mn-cs"/>
+      </a:defRPr>
+    </a:lvl2pPr>
+    <a:lvl3pPr marL="914400" algn="l" defTabSz="914400" rtl="0" eaLnBrk="1" latinLnBrk="1" hangingPunct="1">
+      <a:defRPr sz="1200" kern="1200">
+        <a:solidFill>
+          <a:schemeClr val="tx1"/>
+        </a:solidFill>
+        <a:latin typeface="+mn-lt"/>
+        <a:ea typeface="+mn-ea"/>
+        <a:cs typeface="+mn-cs"/>
+      </a:defRPr>
+    </a:lvl3pPr>
+    <a:lvl4pPr marL="1371600" algn="l" defTabSz="914400" rtl="0" eaLnBrk="1" latinLnBrk="1" hangingPunct="1">
+      <a:defRPr sz="1200" kern="1200">
+        <a:solidFill>
+          <a:schemeClr val="tx1"/>
+        </a:solidFill>
+        <a:latin typeface="+mn-lt"/>
+        <a:ea typeface="+mn-ea"/>
+        <a:cs typeface="+mn-cs"/>
+      </a:defRPr>
+    </a:lvl4pPr>
+    <a:lvl5pPr marL="1828800" algn="l" defTabSz="914400" rtl="0" eaLnBrk="1" latinLnBrk="1" hangingPunct="1">
+      <a:defRPr sz="1200" kern="1200">
+        <a:solidFill>
+          <a:schemeClr val="tx1"/>
+        </a:solidFill>
+        <a:latin typeface="+mn-lt"/>
+        <a:ea typeface="+mn-ea"/>
+        <a:cs typeface="+mn-cs"/>
+      </a:defRPr>
+    </a:lvl5pPr>
+    <a:lvl6pPr marL="2286000" algn="l" defTabSz="914400" rtl="0" eaLnBrk="1" latinLnBrk="1" hangingPunct="1">
+      <a:defRPr sz="1200" kern="1200">
+        <a:solidFill>
+          <a:schemeClr val="tx1"/>
+        </a:solidFill>
+        <a:latin typeface="+mn-lt"/>
+        <a:ea typeface="+mn-ea"/>
+        <a:cs typeface="+mn-cs"/>
+      </a:defRPr>
+    </a:lvl6pPr>
+    <a:lvl7pPr marL="2743200" algn="l" defTabSz="914400" rtl="0" eaLnBrk="1" latinLnBrk="1" hangingPunct="1">
+      <a:defRPr sz="1200" kern="1200">
+        <a:solidFill>
+          <a:schemeClr val="tx1"/>
+        </a:solidFill>
+        <a:latin typeface="+mn-lt"/>
+        <a:ea typeface="+mn-ea"/>
+        <a:cs typeface="+mn-cs"/>
+      </a:defRPr>
+    </a:lvl7pPr>
+    <a:lvl8pPr marL="3200400" algn="l" defTabSz="914400" rtl="0" eaLnBrk="1" latinLnBrk="1" hangingPunct="1">
+      <a:defRPr sz="1200" kern="1200">
+        <a:solidFill>
+          <a:schemeClr val="tx1"/>
+        </a:solidFill>
+        <a:latin typeface="+mn-lt"/>
+        <a:ea typeface="+mn-ea"/>
+        <a:cs typeface="+mn-cs"/>
+      </a:defRPr>
+    </a:lvl8pPr>
+    <a:lvl9pPr marL="3657600" algn="l" defTabSz="914400" rtl="0" eaLnBrk="1" latinLnBrk="1" hangingPunct="1">
+      <a:defRPr sz="1200" kern="1200">
+        <a:solidFill>
+          <a:schemeClr val="tx1"/>
+        </a:solidFill>
+        <a:latin typeface="+mn-lt"/>
+        <a:ea typeface="+mn-ea"/>
+        <a:cs typeface="+mn-cs"/>
+      </a:defRPr>
+    </a:lvl9pPr>
+  </p:notesStyle>
+</p:notesMaster>
+</file>
+
 <file path=ppt/slideLayouts/slideLayout1.xml><?xml version="1.0" encoding="utf-8"?>
 <p:sldLayout xmlns:a="http://schemas.openxmlformats.org/drawingml/2006/main" xmlns:r="http://schemas.openxmlformats.org/officeDocument/2006/relationships" xmlns:p="http://schemas.openxmlformats.org/presentationml/2006/main" type="title" preserve="1">
   <p:cSld name="제목 슬라이드">
@@ -292,7 +643,7 @@
             <a:fld id="{8A936047-5324-45A0-BC5D-984C9165CB63}" type="datetimeFigureOut">
               <a:rPr lang="ko-KR" altLang="en-US" smtClean="0"/>
               <a:pPr/>
-              <a:t>2019-01-10</a:t>
+              <a:t>2019-01-13</a:t>
             </a:fld>
             <a:endParaRPr lang="ko-KR" altLang="en-US"/>
           </a:p>
@@ -459,7 +810,7 @@
             <a:fld id="{8A936047-5324-45A0-BC5D-984C9165CB63}" type="datetimeFigureOut">
               <a:rPr lang="ko-KR" altLang="en-US" smtClean="0"/>
               <a:pPr/>
-              <a:t>2019-01-10</a:t>
+              <a:t>2019-01-13</a:t>
             </a:fld>
             <a:endParaRPr lang="ko-KR" altLang="en-US"/>
           </a:p>
@@ -636,7 +987,7 @@
             <a:fld id="{8A936047-5324-45A0-BC5D-984C9165CB63}" type="datetimeFigureOut">
               <a:rPr lang="ko-KR" altLang="en-US" smtClean="0"/>
               <a:pPr/>
-              <a:t>2019-01-10</a:t>
+              <a:t>2019-01-13</a:t>
             </a:fld>
             <a:endParaRPr lang="ko-KR" altLang="en-US"/>
           </a:p>
@@ -803,7 +1154,7 @@
             <a:fld id="{8A936047-5324-45A0-BC5D-984C9165CB63}" type="datetimeFigureOut">
               <a:rPr lang="ko-KR" altLang="en-US" smtClean="0"/>
               <a:pPr/>
-              <a:t>2019-01-10</a:t>
+              <a:t>2019-01-13</a:t>
             </a:fld>
             <a:endParaRPr lang="ko-KR" altLang="en-US"/>
           </a:p>
@@ -1046,7 +1397,7 @@
             <a:fld id="{8A936047-5324-45A0-BC5D-984C9165CB63}" type="datetimeFigureOut">
               <a:rPr lang="ko-KR" altLang="en-US" smtClean="0"/>
               <a:pPr/>
-              <a:t>2019-01-10</a:t>
+              <a:t>2019-01-13</a:t>
             </a:fld>
             <a:endParaRPr lang="ko-KR" altLang="en-US"/>
           </a:p>
@@ -1331,7 +1682,7 @@
             <a:fld id="{8A936047-5324-45A0-BC5D-984C9165CB63}" type="datetimeFigureOut">
               <a:rPr lang="ko-KR" altLang="en-US" smtClean="0"/>
               <a:pPr/>
-              <a:t>2019-01-10</a:t>
+              <a:t>2019-01-13</a:t>
             </a:fld>
             <a:endParaRPr lang="ko-KR" altLang="en-US"/>
           </a:p>
@@ -1750,7 +2101,7 @@
             <a:fld id="{8A936047-5324-45A0-BC5D-984C9165CB63}" type="datetimeFigureOut">
               <a:rPr lang="ko-KR" altLang="en-US" smtClean="0"/>
               <a:pPr/>
-              <a:t>2019-01-10</a:t>
+              <a:t>2019-01-13</a:t>
             </a:fld>
             <a:endParaRPr lang="ko-KR" altLang="en-US"/>
           </a:p>
@@ -1865,7 +2216,7 @@
             <a:fld id="{8A936047-5324-45A0-BC5D-984C9165CB63}" type="datetimeFigureOut">
               <a:rPr lang="ko-KR" altLang="en-US" smtClean="0"/>
               <a:pPr/>
-              <a:t>2019-01-10</a:t>
+              <a:t>2019-01-13</a:t>
             </a:fld>
             <a:endParaRPr lang="ko-KR" altLang="en-US"/>
           </a:p>
@@ -1957,7 +2308,7 @@
             <a:fld id="{8A936047-5324-45A0-BC5D-984C9165CB63}" type="datetimeFigureOut">
               <a:rPr lang="ko-KR" altLang="en-US" smtClean="0"/>
               <a:pPr/>
-              <a:t>2019-01-10</a:t>
+              <a:t>2019-01-13</a:t>
             </a:fld>
             <a:endParaRPr lang="ko-KR" altLang="en-US"/>
           </a:p>
@@ -2231,7 +2582,7 @@
             <a:fld id="{8A936047-5324-45A0-BC5D-984C9165CB63}" type="datetimeFigureOut">
               <a:rPr lang="ko-KR" altLang="en-US" smtClean="0"/>
               <a:pPr/>
-              <a:t>2019-01-10</a:t>
+              <a:t>2019-01-13</a:t>
             </a:fld>
             <a:endParaRPr lang="ko-KR" altLang="en-US"/>
           </a:p>
@@ -2481,7 +2832,7 @@
             <a:fld id="{8A936047-5324-45A0-BC5D-984C9165CB63}" type="datetimeFigureOut">
               <a:rPr lang="ko-KR" altLang="en-US" smtClean="0"/>
               <a:pPr/>
-              <a:t>2019-01-10</a:t>
+              <a:t>2019-01-13</a:t>
             </a:fld>
             <a:endParaRPr lang="ko-KR" altLang="en-US"/>
           </a:p>
@@ -2694,7 +3045,7 @@
             <a:fld id="{8A936047-5324-45A0-BC5D-984C9165CB63}" type="datetimeFigureOut">
               <a:rPr lang="ko-KR" altLang="en-US" smtClean="0"/>
               <a:pPr/>
-              <a:t>2019-01-10</a:t>
+              <a:t>2019-01-13</a:t>
             </a:fld>
             <a:endParaRPr lang="ko-KR" altLang="en-US"/>
           </a:p>
@@ -15767,6 +16118,1656 @@
 <file path=ppt/slides/slide4.xml><?xml version="1.0" encoding="utf-8"?>
 <p:sld xmlns:a="http://schemas.openxmlformats.org/drawingml/2006/main" xmlns:r="http://schemas.openxmlformats.org/officeDocument/2006/relationships" xmlns:p="http://schemas.openxmlformats.org/presentationml/2006/main">
   <p:cSld>
+    <p:spTree>
+      <p:nvGrpSpPr>
+        <p:cNvPr id="1" name=""/>
+        <p:cNvGrpSpPr/>
+        <p:nvPr/>
+      </p:nvGrpSpPr>
+      <p:grpSpPr>
+        <a:xfrm>
+          <a:off x="0" y="0"/>
+          <a:ext cx="0" cy="0"/>
+          <a:chOff x="0" y="0"/>
+          <a:chExt cx="0" cy="0"/>
+        </a:xfrm>
+      </p:grpSpPr>
+      <p:sp>
+        <p:nvSpPr>
+          <p:cNvPr id="4" name="직사각형 3"/>
+          <p:cNvSpPr/>
+          <p:nvPr/>
+        </p:nvSpPr>
+        <p:spPr>
+          <a:xfrm>
+            <a:off x="323528" y="262984"/>
+            <a:ext cx="1809178" cy="1122297"/>
+          </a:xfrm>
+          <a:prstGeom prst="rect">
+            <a:avLst/>
+          </a:prstGeom>
+          <a:solidFill>
+            <a:schemeClr val="bg1"/>
+          </a:solidFill>
+          <a:ln>
+            <a:solidFill>
+              <a:srgbClr val="87C7D9"/>
+            </a:solidFill>
+          </a:ln>
+        </p:spPr>
+        <p:style>
+          <a:lnRef idx="2">
+            <a:schemeClr val="accent1">
+              <a:shade val="50000"/>
+            </a:schemeClr>
+          </a:lnRef>
+          <a:fillRef idx="1">
+            <a:schemeClr val="accent1"/>
+          </a:fillRef>
+          <a:effectRef idx="0">
+            <a:schemeClr val="accent1"/>
+          </a:effectRef>
+          <a:fontRef idx="minor">
+            <a:schemeClr val="lt1"/>
+          </a:fontRef>
+        </p:style>
+        <p:txBody>
+          <a:bodyPr wrap="none" rtlCol="0" anchor="t" anchorCtr="0"/>
+          <a:lstStyle/>
+          <a:p>
+            <a:pPr algn="ctr"/>
+            <a:endParaRPr lang="en-US" altLang="ko-KR" sz="300" dirty="0" smtClean="0">
+              <a:solidFill>
+                <a:srgbClr val="87C7D9"/>
+              </a:solidFill>
+              <a:latin typeface="나눔스퀘어 ExtraBold" pitchFamily="50" charset="-127"/>
+              <a:ea typeface="나눔스퀘어 ExtraBold" pitchFamily="50" charset="-127"/>
+            </a:endParaRPr>
+          </a:p>
+          <a:p>
+            <a:pPr algn="ctr"/>
+            <a:r>
+              <a:rPr lang="en-US" altLang="ko-KR" sz="1400" dirty="0">
+                <a:solidFill>
+                  <a:srgbClr val="87C7D9"/>
+                </a:solidFill>
+                <a:latin typeface="나눔스퀘어 ExtraBold" pitchFamily="50" charset="-127"/>
+                <a:ea typeface="나눔스퀘어 ExtraBold" pitchFamily="50" charset="-127"/>
+              </a:rPr>
+              <a:t>2</a:t>
+            </a:r>
+            <a:r>
+              <a:rPr lang="ko-KR" altLang="en-US" sz="1400" dirty="0" smtClean="0">
+                <a:solidFill>
+                  <a:srgbClr val="87C7D9"/>
+                </a:solidFill>
+                <a:latin typeface="나눔스퀘어 ExtraBold" pitchFamily="50" charset="-127"/>
+                <a:ea typeface="나눔스퀘어 ExtraBold" pitchFamily="50" charset="-127"/>
+              </a:rPr>
+              <a:t>월</a:t>
+            </a:r>
+          </a:p>
+          <a:p>
+            <a:pPr algn="ctr"/>
+            <a:r>
+              <a:rPr lang="en-US" altLang="ko-KR" sz="800" dirty="0" smtClean="0">
+                <a:solidFill>
+                  <a:srgbClr val="87C7D9"/>
+                </a:solidFill>
+                <a:latin typeface="나눔스퀘어 ExtraBold" pitchFamily="50" charset="-127"/>
+                <a:ea typeface="나눔스퀘어 ExtraBold" pitchFamily="50" charset="-127"/>
+              </a:rPr>
+              <a:t>(85</a:t>
+            </a:r>
+            <a:r>
+              <a:rPr lang="ko-KR" altLang="en-US" sz="800" dirty="0" smtClean="0">
+                <a:solidFill>
+                  <a:srgbClr val="87C7D9"/>
+                </a:solidFill>
+                <a:latin typeface="나눔스퀘어 ExtraBold" pitchFamily="50" charset="-127"/>
+                <a:ea typeface="나눔스퀘어 ExtraBold" pitchFamily="50" charset="-127"/>
+              </a:rPr>
+              <a:t>건</a:t>
+            </a:r>
+            <a:r>
+              <a:rPr lang="en-US" altLang="ko-KR" sz="800" dirty="0" smtClean="0">
+                <a:solidFill>
+                  <a:srgbClr val="87C7D9"/>
+                </a:solidFill>
+                <a:latin typeface="나눔스퀘어 ExtraBold" pitchFamily="50" charset="-127"/>
+                <a:ea typeface="나눔스퀘어 ExtraBold" pitchFamily="50" charset="-127"/>
+              </a:rPr>
+              <a:t>)</a:t>
+            </a:r>
+          </a:p>
+          <a:p>
+            <a:pPr algn="ctr"/>
+            <a:endParaRPr lang="en-US" altLang="ko-KR" sz="700" dirty="0" smtClean="0">
+              <a:solidFill>
+                <a:srgbClr val="87C7D9"/>
+              </a:solidFill>
+              <a:latin typeface="나눔스퀘어 ExtraBold" pitchFamily="50" charset="-127"/>
+              <a:ea typeface="나눔스퀘어 ExtraBold" pitchFamily="50" charset="-127"/>
+            </a:endParaRPr>
+          </a:p>
+          <a:p>
+            <a:pPr algn="ctr"/>
+            <a:r>
+              <a:rPr lang="ko-KR" altLang="en-US" sz="1100" dirty="0" smtClean="0">
+                <a:solidFill>
+                  <a:srgbClr val="87C7D9"/>
+                </a:solidFill>
+                <a:latin typeface="나눔스퀘어 ExtraBold" pitchFamily="50" charset="-127"/>
+                <a:ea typeface="나눔스퀘어 ExtraBold" pitchFamily="50" charset="-127"/>
+              </a:rPr>
+              <a:t>매입총액 </a:t>
+            </a:r>
+            <a:r>
+              <a:rPr lang="en-US" altLang="ko-KR" sz="1100" dirty="0" smtClean="0">
+                <a:solidFill>
+                  <a:srgbClr val="87C7D9"/>
+                </a:solidFill>
+                <a:latin typeface="나눔스퀘어 ExtraBold" pitchFamily="50" charset="-127"/>
+                <a:ea typeface="나눔스퀘어 ExtraBold" pitchFamily="50" charset="-127"/>
+              </a:rPr>
+              <a:t>: 79,852,000</a:t>
+            </a:r>
+          </a:p>
+          <a:p>
+            <a:pPr algn="ctr"/>
+            <a:endParaRPr lang="en-US" altLang="ko-KR" sz="200" dirty="0" smtClean="0">
+              <a:solidFill>
+                <a:srgbClr val="87C7D9"/>
+              </a:solidFill>
+              <a:latin typeface="나눔스퀘어 ExtraBold" pitchFamily="50" charset="-127"/>
+              <a:ea typeface="나눔스퀘어 ExtraBold" pitchFamily="50" charset="-127"/>
+            </a:endParaRPr>
+          </a:p>
+          <a:p>
+            <a:r>
+              <a:rPr lang="en-US" altLang="ko-KR" sz="1000" dirty="0" smtClean="0">
+                <a:solidFill>
+                  <a:srgbClr val="87C7D9"/>
+                </a:solidFill>
+                <a:latin typeface="나눔스퀘어 ExtraBold" pitchFamily="50" charset="-127"/>
+                <a:ea typeface="나눔스퀘어 ExtraBold" pitchFamily="50" charset="-127"/>
+              </a:rPr>
+              <a:t> </a:t>
+            </a:r>
+            <a:r>
+              <a:rPr lang="en-US" altLang="ko-KR" sz="950" dirty="0" smtClean="0">
+                <a:solidFill>
+                  <a:srgbClr val="87C7D9"/>
+                </a:solidFill>
+                <a:latin typeface="나눔스퀘어 ExtraBold" pitchFamily="50" charset="-127"/>
+                <a:ea typeface="나눔스퀘어 ExtraBold" pitchFamily="50" charset="-127"/>
+              </a:rPr>
+              <a:t>  </a:t>
+            </a:r>
+            <a:r>
+              <a:rPr lang="en-US" altLang="ko-KR" sz="900" dirty="0" smtClean="0">
+                <a:solidFill>
+                  <a:srgbClr val="87C7D9"/>
+                </a:solidFill>
+                <a:latin typeface="나눔스퀘어 ExtraBold" pitchFamily="50" charset="-127"/>
+                <a:ea typeface="나눔스퀘어 ExtraBold" pitchFamily="50" charset="-127"/>
+              </a:rPr>
+              <a:t> - </a:t>
+            </a:r>
+            <a:r>
+              <a:rPr lang="ko-KR" altLang="en-US" sz="900" dirty="0" smtClean="0">
+                <a:solidFill>
+                  <a:srgbClr val="87C7D9"/>
+                </a:solidFill>
+                <a:latin typeface="나눔스퀘어 ExtraBold" pitchFamily="50" charset="-127"/>
+                <a:ea typeface="나눔스퀘어 ExtraBold" pitchFamily="50" charset="-127"/>
+              </a:rPr>
+              <a:t>총 공급가액 </a:t>
+            </a:r>
+            <a:r>
+              <a:rPr lang="en-US" altLang="ko-KR" sz="900" dirty="0" smtClean="0">
+                <a:solidFill>
+                  <a:srgbClr val="87C7D9"/>
+                </a:solidFill>
+                <a:latin typeface="나눔스퀘어 ExtraBold" pitchFamily="50" charset="-127"/>
+                <a:ea typeface="나눔스퀘어 ExtraBold" pitchFamily="50" charset="-127"/>
+              </a:rPr>
+              <a:t>: 71,866,800</a:t>
+            </a:r>
+          </a:p>
+          <a:p>
+            <a:r>
+              <a:rPr lang="en-US" altLang="ko-KR" sz="900" dirty="0" smtClean="0">
+                <a:solidFill>
+                  <a:srgbClr val="87C7D9"/>
+                </a:solidFill>
+                <a:latin typeface="나눔스퀘어 ExtraBold" pitchFamily="50" charset="-127"/>
+                <a:ea typeface="나눔스퀘어 ExtraBold" pitchFamily="50" charset="-127"/>
+              </a:rPr>
+              <a:t>    - </a:t>
+            </a:r>
+            <a:r>
+              <a:rPr lang="ko-KR" altLang="en-US" sz="900" dirty="0" smtClean="0">
+                <a:solidFill>
+                  <a:srgbClr val="87C7D9"/>
+                </a:solidFill>
+                <a:latin typeface="나눔스퀘어 ExtraBold" pitchFamily="50" charset="-127"/>
+                <a:ea typeface="나눔스퀘어 ExtraBold" pitchFamily="50" charset="-127"/>
+              </a:rPr>
+              <a:t>총 세액 </a:t>
+            </a:r>
+            <a:r>
+              <a:rPr lang="en-US" altLang="ko-KR" sz="900" dirty="0" smtClean="0">
+                <a:solidFill>
+                  <a:srgbClr val="87C7D9"/>
+                </a:solidFill>
+                <a:latin typeface="나눔스퀘어 ExtraBold" pitchFamily="50" charset="-127"/>
+                <a:ea typeface="나눔스퀘어 ExtraBold" pitchFamily="50" charset="-127"/>
+              </a:rPr>
+              <a:t>: 7,985,200 </a:t>
+            </a:r>
+          </a:p>
+        </p:txBody>
+      </p:sp>
+      <p:sp>
+        <p:nvSpPr>
+          <p:cNvPr id="5" name="TextBox 4"/>
+          <p:cNvSpPr txBox="1"/>
+          <p:nvPr/>
+        </p:nvSpPr>
+        <p:spPr>
+          <a:xfrm>
+            <a:off x="2411760" y="245566"/>
+            <a:ext cx="2795966" cy="1532334"/>
+          </a:xfrm>
+          <a:prstGeom prst="roundRect">
+            <a:avLst/>
+          </a:prstGeom>
+          <a:noFill/>
+          <a:ln w="28575">
+            <a:solidFill>
+              <a:srgbClr val="87C7D9"/>
+            </a:solidFill>
+          </a:ln>
+        </p:spPr>
+        <p:txBody>
+          <a:bodyPr wrap="square" rtlCol="0">
+            <a:spAutoFit/>
+          </a:bodyPr>
+          <a:lstStyle/>
+          <a:p>
+            <a:r>
+              <a:rPr lang="en-US" altLang="ko-KR" sz="1200" dirty="0" smtClean="0">
+                <a:latin typeface="나눔스퀘어 Bold" pitchFamily="50" charset="-127"/>
+                <a:ea typeface="나눔스퀘어 Bold" pitchFamily="50" charset="-127"/>
+              </a:rPr>
+              <a:t>Control</a:t>
+            </a:r>
+            <a:r>
+              <a:rPr lang="ko-KR" altLang="en-US" sz="1200" dirty="0" smtClean="0">
+                <a:latin typeface="나눔스퀘어 Bold" pitchFamily="50" charset="-127"/>
+                <a:ea typeface="나눔스퀘어 Bold" pitchFamily="50" charset="-127"/>
+              </a:rPr>
+              <a:t>에서 </a:t>
+            </a:r>
+            <a:r>
+              <a:rPr lang="en-US" altLang="ko-KR" sz="1200" dirty="0" smtClean="0">
+                <a:latin typeface="나눔스퀘어 Bold" pitchFamily="50" charset="-127"/>
+                <a:ea typeface="나눔스퀘어 Bold" pitchFamily="50" charset="-127"/>
+              </a:rPr>
+              <a:t>Binding </a:t>
+            </a:r>
+            <a:r>
+              <a:rPr lang="ko-KR" altLang="en-US" sz="1200" dirty="0" err="1" smtClean="0">
+                <a:latin typeface="나눔스퀘어 Bold" pitchFamily="50" charset="-127"/>
+                <a:ea typeface="나눔스퀘어 Bold" pitchFamily="50" charset="-127"/>
+              </a:rPr>
+              <a:t>해야할</a:t>
+            </a:r>
+            <a:r>
+              <a:rPr lang="ko-KR" altLang="en-US" sz="1200" dirty="0" smtClean="0">
+                <a:latin typeface="나눔스퀘어 Bold" pitchFamily="50" charset="-127"/>
+                <a:ea typeface="나눔스퀘어 Bold" pitchFamily="50" charset="-127"/>
+              </a:rPr>
+              <a:t> </a:t>
+            </a:r>
+            <a:r>
+              <a:rPr lang="en-US" altLang="ko-KR" sz="1200" dirty="0" smtClean="0">
+                <a:latin typeface="나눔스퀘어 Bold" pitchFamily="50" charset="-127"/>
+                <a:ea typeface="나눔스퀘어 Bold" pitchFamily="50" charset="-127"/>
+              </a:rPr>
+              <a:t>Data</a:t>
+            </a:r>
+            <a:endParaRPr lang="en-US" altLang="ko-KR" sz="1200" dirty="0" smtClean="0">
+              <a:latin typeface="나눔스퀘어 Bold" pitchFamily="50" charset="-127"/>
+              <a:ea typeface="나눔스퀘어 Bold" pitchFamily="50" charset="-127"/>
+            </a:endParaRPr>
+          </a:p>
+          <a:p>
+            <a:r>
+              <a:rPr lang="en-US" altLang="ko-KR" sz="1200" dirty="0" smtClean="0">
+                <a:latin typeface="나눔스퀘어 Bold" pitchFamily="50" charset="-127"/>
+                <a:ea typeface="나눔스퀘어 Bold" pitchFamily="50" charset="-127"/>
+              </a:rPr>
+              <a:t>   - </a:t>
+            </a:r>
+            <a:r>
+              <a:rPr lang="ko-KR" altLang="en-US" sz="1200" dirty="0" smtClean="0">
+                <a:latin typeface="나눔스퀘어 Bold" pitchFamily="50" charset="-127"/>
+                <a:ea typeface="나눔스퀘어 Bold" pitchFamily="50" charset="-127"/>
+              </a:rPr>
+              <a:t>월</a:t>
+            </a:r>
+            <a:endParaRPr lang="en-US" altLang="ko-KR" sz="1200" dirty="0" smtClean="0">
+              <a:latin typeface="나눔스퀘어 Bold" pitchFamily="50" charset="-127"/>
+              <a:ea typeface="나눔스퀘어 Bold" pitchFamily="50" charset="-127"/>
+            </a:endParaRPr>
+          </a:p>
+          <a:p>
+            <a:r>
+              <a:rPr lang="en-US" altLang="ko-KR" sz="1200" dirty="0" smtClean="0">
+                <a:latin typeface="나눔스퀘어 Bold" pitchFamily="50" charset="-127"/>
+                <a:ea typeface="나눔스퀘어 Bold" pitchFamily="50" charset="-127"/>
+              </a:rPr>
+              <a:t>   - </a:t>
+            </a:r>
+            <a:r>
+              <a:rPr lang="ko-KR" altLang="en-US" sz="1200" dirty="0" smtClean="0">
+                <a:latin typeface="나눔스퀘어 Bold" pitchFamily="50" charset="-127"/>
+                <a:ea typeface="나눔스퀘어 Bold" pitchFamily="50" charset="-127"/>
+              </a:rPr>
+              <a:t>총 거래 건수</a:t>
+            </a:r>
+            <a:endParaRPr lang="en-US" altLang="ko-KR" sz="1200" dirty="0" smtClean="0">
+              <a:latin typeface="나눔스퀘어 Bold" pitchFamily="50" charset="-127"/>
+              <a:ea typeface="나눔스퀘어 Bold" pitchFamily="50" charset="-127"/>
+            </a:endParaRPr>
+          </a:p>
+          <a:p>
+            <a:r>
+              <a:rPr lang="en-US" altLang="ko-KR" sz="1200" dirty="0" smtClean="0">
+                <a:latin typeface="나눔스퀘어 Bold" pitchFamily="50" charset="-127"/>
+                <a:ea typeface="나눔스퀘어 Bold" pitchFamily="50" charset="-127"/>
+              </a:rPr>
+              <a:t> </a:t>
+            </a:r>
+            <a:r>
+              <a:rPr lang="en-US" altLang="ko-KR" sz="1200" dirty="0" smtClean="0">
+                <a:latin typeface="나눔스퀘어 Bold" pitchFamily="50" charset="-127"/>
+                <a:ea typeface="나눔스퀘어 Bold" pitchFamily="50" charset="-127"/>
+              </a:rPr>
+              <a:t>  - </a:t>
+            </a:r>
+            <a:r>
+              <a:rPr lang="ko-KR" altLang="en-US" sz="1200" dirty="0" smtClean="0">
+                <a:latin typeface="나눔스퀘어 Bold" pitchFamily="50" charset="-127"/>
+                <a:ea typeface="나눔스퀘어 Bold" pitchFamily="50" charset="-127"/>
+              </a:rPr>
+              <a:t>매입 총액</a:t>
+            </a:r>
+            <a:endParaRPr lang="en-US" altLang="ko-KR" sz="1200" dirty="0" smtClean="0">
+              <a:latin typeface="나눔스퀘어 Bold" pitchFamily="50" charset="-127"/>
+              <a:ea typeface="나눔스퀘어 Bold" pitchFamily="50" charset="-127"/>
+            </a:endParaRPr>
+          </a:p>
+          <a:p>
+            <a:r>
+              <a:rPr lang="en-US" altLang="ko-KR" sz="1200" dirty="0" smtClean="0">
+                <a:latin typeface="나눔스퀘어 Bold" pitchFamily="50" charset="-127"/>
+                <a:ea typeface="나눔스퀘어 Bold" pitchFamily="50" charset="-127"/>
+              </a:rPr>
+              <a:t> </a:t>
+            </a:r>
+            <a:r>
+              <a:rPr lang="en-US" altLang="ko-KR" sz="1200" dirty="0" smtClean="0">
+                <a:latin typeface="나눔스퀘어 Bold" pitchFamily="50" charset="-127"/>
+                <a:ea typeface="나눔스퀘어 Bold" pitchFamily="50" charset="-127"/>
+              </a:rPr>
+              <a:t>  - </a:t>
+            </a:r>
+            <a:r>
+              <a:rPr lang="ko-KR" altLang="en-US" sz="1200" dirty="0" smtClean="0">
+                <a:latin typeface="나눔스퀘어 Bold" pitchFamily="50" charset="-127"/>
+                <a:ea typeface="나눔스퀘어 Bold" pitchFamily="50" charset="-127"/>
+              </a:rPr>
+              <a:t>총 공급가액</a:t>
+            </a:r>
+            <a:endParaRPr lang="en-US" altLang="ko-KR" sz="1200" dirty="0" smtClean="0">
+              <a:latin typeface="나눔스퀘어 Bold" pitchFamily="50" charset="-127"/>
+              <a:ea typeface="나눔스퀘어 Bold" pitchFamily="50" charset="-127"/>
+            </a:endParaRPr>
+          </a:p>
+          <a:p>
+            <a:r>
+              <a:rPr lang="en-US" altLang="ko-KR" sz="1200" dirty="0" smtClean="0">
+                <a:latin typeface="나눔스퀘어 Bold" pitchFamily="50" charset="-127"/>
+                <a:ea typeface="나눔스퀘어 Bold" pitchFamily="50" charset="-127"/>
+              </a:rPr>
+              <a:t>   - </a:t>
+            </a:r>
+            <a:r>
+              <a:rPr lang="ko-KR" altLang="en-US" sz="1200" dirty="0" smtClean="0">
+                <a:latin typeface="나눔스퀘어 Bold" pitchFamily="50" charset="-127"/>
+                <a:ea typeface="나눔스퀘어 Bold" pitchFamily="50" charset="-127"/>
+              </a:rPr>
+              <a:t>총 세액</a:t>
+            </a:r>
+            <a:endParaRPr lang="en-US" altLang="ko-KR" sz="1200" dirty="0" smtClean="0">
+              <a:latin typeface="나눔스퀘어 Bold" pitchFamily="50" charset="-127"/>
+              <a:ea typeface="나눔스퀘어 Bold" pitchFamily="50" charset="-127"/>
+            </a:endParaRPr>
+          </a:p>
+          <a:p>
+            <a:r>
+              <a:rPr lang="ko-KR" altLang="en-US" sz="1200" dirty="0" smtClean="0">
+                <a:solidFill>
+                  <a:srgbClr val="FF0000"/>
+                </a:solidFill>
+                <a:latin typeface="나눔스퀘어 Bold" pitchFamily="50" charset="-127"/>
+                <a:ea typeface="나눔스퀘어 Bold" pitchFamily="50" charset="-127"/>
+              </a:rPr>
+              <a:t>→</a:t>
+            </a:r>
+            <a:r>
+              <a:rPr lang="en-US" altLang="ko-KR" sz="1200" dirty="0" smtClean="0">
+                <a:solidFill>
+                  <a:srgbClr val="FF0000"/>
+                </a:solidFill>
+                <a:latin typeface="나눔스퀘어 Bold" pitchFamily="50" charset="-127"/>
+                <a:ea typeface="나눔스퀘어 Bold" pitchFamily="50" charset="-127"/>
+              </a:rPr>
+              <a:t> </a:t>
+            </a:r>
+            <a:r>
+              <a:rPr lang="ko-KR" altLang="en-US" sz="1200" dirty="0" smtClean="0">
+                <a:solidFill>
+                  <a:srgbClr val="FF0000"/>
+                </a:solidFill>
+                <a:latin typeface="나눔스퀘어 Bold" pitchFamily="50" charset="-127"/>
+                <a:ea typeface="나눔스퀘어 Bold" pitchFamily="50" charset="-127"/>
+              </a:rPr>
+              <a:t>한 달의 거래 요약 </a:t>
+            </a:r>
+            <a:r>
+              <a:rPr lang="en-US" altLang="ko-KR" sz="1200" dirty="0" smtClean="0">
+                <a:solidFill>
+                  <a:srgbClr val="FF0000"/>
+                </a:solidFill>
+                <a:latin typeface="나눔스퀘어 Bold" pitchFamily="50" charset="-127"/>
+                <a:ea typeface="나눔스퀘어 Bold" pitchFamily="50" charset="-127"/>
+              </a:rPr>
+              <a:t>Data</a:t>
+            </a:r>
+            <a:r>
+              <a:rPr lang="ko-KR" altLang="en-US" sz="1200" dirty="0" smtClean="0">
+                <a:solidFill>
+                  <a:srgbClr val="FF0000"/>
+                </a:solidFill>
+                <a:latin typeface="나눔스퀘어 Bold" pitchFamily="50" charset="-127"/>
+                <a:ea typeface="나눔스퀘어 Bold" pitchFamily="50" charset="-127"/>
+              </a:rPr>
+              <a:t>를 필요로 함</a:t>
+            </a:r>
+            <a:r>
+              <a:rPr lang="en-US" altLang="ko-KR" sz="1200" dirty="0" smtClean="0">
+                <a:solidFill>
+                  <a:srgbClr val="FF0000"/>
+                </a:solidFill>
+                <a:latin typeface="나눔스퀘어 Bold" pitchFamily="50" charset="-127"/>
+                <a:ea typeface="나눔스퀘어 Bold" pitchFamily="50" charset="-127"/>
+              </a:rPr>
+              <a:t>.  </a:t>
+            </a:r>
+          </a:p>
+        </p:txBody>
+      </p:sp>
+      <p:sp>
+        <p:nvSpPr>
+          <p:cNvPr id="6" name="TextBox 5"/>
+          <p:cNvSpPr txBox="1"/>
+          <p:nvPr/>
+        </p:nvSpPr>
+        <p:spPr>
+          <a:xfrm>
+            <a:off x="323528" y="1415112"/>
+            <a:ext cx="1800200" cy="307777"/>
+          </a:xfrm>
+          <a:prstGeom prst="rect">
+            <a:avLst/>
+          </a:prstGeom>
+          <a:noFill/>
+        </p:spPr>
+        <p:txBody>
+          <a:bodyPr wrap="square" rtlCol="0">
+            <a:spAutoFit/>
+          </a:bodyPr>
+          <a:lstStyle/>
+          <a:p>
+            <a:pPr algn="ctr"/>
+            <a:r>
+              <a:rPr lang="en-US" altLang="ko-KR" sz="1400" dirty="0" err="1" smtClean="0">
+                <a:latin typeface="나눔스퀘어 Bold" pitchFamily="50" charset="-127"/>
+                <a:ea typeface="나눔스퀘어 Bold" pitchFamily="50" charset="-127"/>
+              </a:rPr>
+              <a:t>SummaryButton</a:t>
+            </a:r>
+            <a:endParaRPr lang="ko-KR" altLang="en-US" sz="1400" dirty="0">
+              <a:latin typeface="나눔스퀘어 Bold" pitchFamily="50" charset="-127"/>
+              <a:ea typeface="나눔스퀘어 Bold" pitchFamily="50" charset="-127"/>
+            </a:endParaRPr>
+          </a:p>
+        </p:txBody>
+      </p:sp>
+      <p:grpSp>
+        <p:nvGrpSpPr>
+          <p:cNvPr id="31" name="그룹 30"/>
+          <p:cNvGrpSpPr/>
+          <p:nvPr/>
+        </p:nvGrpSpPr>
+        <p:grpSpPr>
+          <a:xfrm>
+            <a:off x="971600" y="2161888"/>
+            <a:ext cx="7048232" cy="1339120"/>
+            <a:chOff x="115988" y="2636912"/>
+            <a:chExt cx="7048232" cy="1339120"/>
+          </a:xfrm>
+        </p:grpSpPr>
+        <p:grpSp>
+          <p:nvGrpSpPr>
+            <p:cNvPr id="11" name="그룹 10"/>
+            <p:cNvGrpSpPr/>
+            <p:nvPr/>
+          </p:nvGrpSpPr>
+          <p:grpSpPr>
+            <a:xfrm>
+              <a:off x="115988" y="3081739"/>
+              <a:ext cx="1359668" cy="894293"/>
+              <a:chOff x="115988" y="3645024"/>
+              <a:chExt cx="1359668" cy="894293"/>
+            </a:xfrm>
+          </p:grpSpPr>
+          <p:pic>
+            <p:nvPicPr>
+              <p:cNvPr id="1026" name="Picture 2"/>
+              <p:cNvPicPr>
+                <a:picLocks noChangeAspect="1" noChangeArrowheads="1"/>
+              </p:cNvPicPr>
+              <p:nvPr/>
+            </p:nvPicPr>
+            <p:blipFill>
+              <a:blip r:embed="rId2" cstate="print"/>
+              <a:srcRect/>
+              <a:stretch>
+                <a:fillRect/>
+              </a:stretch>
+            </p:blipFill>
+            <p:spPr bwMode="auto">
+              <a:xfrm>
+                <a:off x="497316" y="3645024"/>
+                <a:ext cx="597012" cy="643532"/>
+              </a:xfrm>
+              <a:prstGeom prst="rect">
+                <a:avLst/>
+              </a:prstGeom>
+              <a:noFill/>
+              <a:ln w="9525">
+                <a:noFill/>
+                <a:miter lim="800000"/>
+                <a:headEnd/>
+                <a:tailEnd/>
+              </a:ln>
+            </p:spPr>
+          </p:pic>
+          <p:sp>
+            <p:nvSpPr>
+              <p:cNvPr id="9" name="TextBox 8"/>
+              <p:cNvSpPr txBox="1"/>
+              <p:nvPr/>
+            </p:nvSpPr>
+            <p:spPr>
+              <a:xfrm>
+                <a:off x="115988" y="4293096"/>
+                <a:ext cx="1359668" cy="246221"/>
+              </a:xfrm>
+              <a:prstGeom prst="rect">
+                <a:avLst/>
+              </a:prstGeom>
+              <a:noFill/>
+            </p:spPr>
+            <p:txBody>
+              <a:bodyPr wrap="none" rtlCol="0">
+                <a:spAutoFit/>
+              </a:bodyPr>
+              <a:lstStyle/>
+              <a:p>
+                <a:r>
+                  <a:rPr lang="ko-KR" altLang="en-US" sz="1000" dirty="0" smtClean="0">
+                    <a:latin typeface="나눔스퀘어 Bold" pitchFamily="50" charset="-127"/>
+                    <a:ea typeface="나눔스퀘어 Bold" pitchFamily="50" charset="-127"/>
+                  </a:rPr>
+                  <a:t>매입실적</a:t>
+                </a:r>
+                <a:r>
+                  <a:rPr lang="en-US" altLang="ko-KR" sz="1000" dirty="0" smtClean="0">
+                    <a:latin typeface="나눔스퀘어 Bold" pitchFamily="50" charset="-127"/>
+                    <a:ea typeface="나눔스퀘어 Bold" pitchFamily="50" charset="-127"/>
+                  </a:rPr>
+                  <a:t>\2019.xlsx</a:t>
+                </a:r>
+                <a:endParaRPr lang="ko-KR" altLang="en-US" sz="1000" dirty="0">
+                  <a:latin typeface="나눔스퀘어 Bold" pitchFamily="50" charset="-127"/>
+                  <a:ea typeface="나눔스퀘어 Bold" pitchFamily="50" charset="-127"/>
+                </a:endParaRPr>
+              </a:p>
+            </p:txBody>
+          </p:sp>
+        </p:grpSp>
+        <p:sp>
+          <p:nvSpPr>
+            <p:cNvPr id="10" name="직사각형 9"/>
+            <p:cNvSpPr/>
+            <p:nvPr/>
+          </p:nvSpPr>
+          <p:spPr>
+            <a:xfrm>
+              <a:off x="2088308" y="3384869"/>
+              <a:ext cx="1224136" cy="288032"/>
+            </a:xfrm>
+            <a:prstGeom prst="rect">
+              <a:avLst/>
+            </a:prstGeom>
+            <a:solidFill>
+              <a:schemeClr val="bg1"/>
+            </a:solidFill>
+            <a:ln>
+              <a:solidFill>
+                <a:srgbClr val="60B5CC"/>
+              </a:solidFill>
+            </a:ln>
+          </p:spPr>
+          <p:style>
+            <a:lnRef idx="2">
+              <a:schemeClr val="accent1">
+                <a:shade val="50000"/>
+              </a:schemeClr>
+            </a:lnRef>
+            <a:fillRef idx="1">
+              <a:schemeClr val="accent1"/>
+            </a:fillRef>
+            <a:effectRef idx="0">
+              <a:schemeClr val="accent1"/>
+            </a:effectRef>
+            <a:fontRef idx="minor">
+              <a:schemeClr val="lt1"/>
+            </a:fontRef>
+          </p:style>
+          <p:txBody>
+            <a:bodyPr wrap="none" rtlCol="0" anchor="ctr"/>
+            <a:lstStyle/>
+            <a:p>
+              <a:pPr algn="ctr"/>
+              <a:r>
+                <a:rPr lang="en-US" altLang="ko-KR" sz="1000" dirty="0" err="1" smtClean="0">
+                  <a:solidFill>
+                    <a:schemeClr val="tx1"/>
+                  </a:solidFill>
+                  <a:latin typeface="나눔스퀘어 ExtraBold" pitchFamily="50" charset="-127"/>
+                  <a:ea typeface="나눔스퀘어 ExtraBold" pitchFamily="50" charset="-127"/>
+                </a:rPr>
+                <a:t>TradingWorkBook</a:t>
+              </a:r>
+              <a:endParaRPr lang="ko-KR" altLang="en-US" sz="1000" dirty="0">
+                <a:solidFill>
+                  <a:schemeClr val="tx1"/>
+                </a:solidFill>
+                <a:latin typeface="나눔스퀘어 ExtraBold" pitchFamily="50" charset="-127"/>
+                <a:ea typeface="나눔스퀘어 ExtraBold" pitchFamily="50" charset="-127"/>
+              </a:endParaRPr>
+            </a:p>
+          </p:txBody>
+        </p:sp>
+        <p:sp>
+          <p:nvSpPr>
+            <p:cNvPr id="12" name="TextBox 11"/>
+            <p:cNvSpPr txBox="1"/>
+            <p:nvPr/>
+          </p:nvSpPr>
+          <p:spPr>
+            <a:xfrm>
+              <a:off x="2088376" y="2636912"/>
+              <a:ext cx="1224000" cy="246221"/>
+            </a:xfrm>
+            <a:prstGeom prst="rect">
+              <a:avLst/>
+            </a:prstGeom>
+            <a:solidFill>
+              <a:srgbClr val="60B5CC"/>
+            </a:solidFill>
+            <a:ln w="28575">
+              <a:noFill/>
+            </a:ln>
+          </p:spPr>
+          <p:txBody>
+            <a:bodyPr wrap="square" rtlCol="0">
+              <a:spAutoFit/>
+            </a:bodyPr>
+            <a:lstStyle/>
+            <a:p>
+              <a:pPr algn="ctr"/>
+              <a:r>
+                <a:rPr lang="en-US" altLang="ko-KR" sz="1000" dirty="0" err="1" smtClean="0">
+                  <a:solidFill>
+                    <a:schemeClr val="bg1"/>
+                  </a:solidFill>
+                  <a:latin typeface="나눔스퀘어 Bold" pitchFamily="50" charset="-127"/>
+                  <a:ea typeface="나눔스퀘어 Bold" pitchFamily="50" charset="-127"/>
+                </a:rPr>
+                <a:t>WorkBook</a:t>
+              </a:r>
+              <a:endParaRPr lang="ko-KR" altLang="en-US" sz="1000" dirty="0">
+                <a:solidFill>
+                  <a:schemeClr val="bg1"/>
+                </a:solidFill>
+                <a:latin typeface="나눔스퀘어 Bold" pitchFamily="50" charset="-127"/>
+                <a:ea typeface="나눔스퀘어 Bold" pitchFamily="50" charset="-127"/>
+              </a:endParaRPr>
+            </a:p>
+          </p:txBody>
+        </p:sp>
+        <p:sp>
+          <p:nvSpPr>
+            <p:cNvPr id="13" name="TextBox 12"/>
+            <p:cNvSpPr txBox="1"/>
+            <p:nvPr/>
+          </p:nvSpPr>
+          <p:spPr>
+            <a:xfrm>
+              <a:off x="183822" y="2636912"/>
+              <a:ext cx="1224000" cy="246221"/>
+            </a:xfrm>
+            <a:prstGeom prst="rect">
+              <a:avLst/>
+            </a:prstGeom>
+            <a:solidFill>
+              <a:srgbClr val="60B5CC"/>
+            </a:solidFill>
+            <a:ln w="28575">
+              <a:noFill/>
+            </a:ln>
+          </p:spPr>
+          <p:txBody>
+            <a:bodyPr wrap="square" rtlCol="0">
+              <a:spAutoFit/>
+            </a:bodyPr>
+            <a:lstStyle/>
+            <a:p>
+              <a:pPr algn="ctr"/>
+              <a:r>
+                <a:rPr lang="en-US" altLang="ko-KR" sz="1000" dirty="0" smtClean="0">
+                  <a:solidFill>
+                    <a:schemeClr val="bg1"/>
+                  </a:solidFill>
+                  <a:latin typeface="나눔스퀘어 Bold" pitchFamily="50" charset="-127"/>
+                  <a:ea typeface="나눔스퀘어 Bold" pitchFamily="50" charset="-127"/>
+                </a:rPr>
+                <a:t>File</a:t>
+              </a:r>
+              <a:endParaRPr lang="ko-KR" altLang="en-US" sz="1000" dirty="0">
+                <a:solidFill>
+                  <a:schemeClr val="bg1"/>
+                </a:solidFill>
+                <a:latin typeface="나눔스퀘어 Bold" pitchFamily="50" charset="-127"/>
+                <a:ea typeface="나눔스퀘어 Bold" pitchFamily="50" charset="-127"/>
+              </a:endParaRPr>
+            </a:p>
+          </p:txBody>
+        </p:sp>
+        <p:cxnSp>
+          <p:nvCxnSpPr>
+            <p:cNvPr id="15" name="직선 화살표 연결선 14"/>
+            <p:cNvCxnSpPr/>
+            <p:nvPr/>
+          </p:nvCxnSpPr>
+          <p:spPr>
+            <a:xfrm flipV="1">
+              <a:off x="1555848" y="3528885"/>
+              <a:ext cx="396000" cy="0"/>
+            </a:xfrm>
+            <a:prstGeom prst="straightConnector1">
+              <a:avLst/>
+            </a:prstGeom>
+            <a:ln w="38100">
+              <a:solidFill>
+                <a:srgbClr val="60B5CC"/>
+              </a:solidFill>
+              <a:headEnd type="none" w="med" len="med"/>
+              <a:tailEnd type="triangle" w="med" len="med"/>
+            </a:ln>
+          </p:spPr>
+          <p:style>
+            <a:lnRef idx="1">
+              <a:schemeClr val="accent1"/>
+            </a:lnRef>
+            <a:fillRef idx="0">
+              <a:schemeClr val="accent1"/>
+            </a:fillRef>
+            <a:effectRef idx="0">
+              <a:schemeClr val="accent1"/>
+            </a:effectRef>
+            <a:fontRef idx="minor">
+              <a:schemeClr val="tx1"/>
+            </a:fontRef>
+          </p:style>
+        </p:cxnSp>
+        <p:sp>
+          <p:nvSpPr>
+            <p:cNvPr id="23" name="직사각형 22"/>
+            <p:cNvSpPr/>
+            <p:nvPr/>
+          </p:nvSpPr>
+          <p:spPr>
+            <a:xfrm>
+              <a:off x="3995868" y="3384869"/>
+              <a:ext cx="1224136" cy="288032"/>
+            </a:xfrm>
+            <a:prstGeom prst="rect">
+              <a:avLst/>
+            </a:prstGeom>
+            <a:solidFill>
+              <a:schemeClr val="bg1"/>
+            </a:solidFill>
+            <a:ln>
+              <a:solidFill>
+                <a:srgbClr val="60B5CC"/>
+              </a:solidFill>
+            </a:ln>
+          </p:spPr>
+          <p:style>
+            <a:lnRef idx="2">
+              <a:schemeClr val="accent1">
+                <a:shade val="50000"/>
+              </a:schemeClr>
+            </a:lnRef>
+            <a:fillRef idx="1">
+              <a:schemeClr val="accent1"/>
+            </a:fillRef>
+            <a:effectRef idx="0">
+              <a:schemeClr val="accent1"/>
+            </a:effectRef>
+            <a:fontRef idx="minor">
+              <a:schemeClr val="lt1"/>
+            </a:fontRef>
+          </p:style>
+          <p:txBody>
+            <a:bodyPr wrap="none" rtlCol="0" anchor="ctr"/>
+            <a:lstStyle/>
+            <a:p>
+              <a:pPr algn="ctr"/>
+              <a:r>
+                <a:rPr lang="en-US" altLang="ko-KR" sz="1000" dirty="0" smtClean="0">
+                  <a:solidFill>
+                    <a:schemeClr val="tx1"/>
+                  </a:solidFill>
+                  <a:latin typeface="나눔스퀘어 ExtraBold" pitchFamily="50" charset="-127"/>
+                  <a:ea typeface="나눔스퀘어 ExtraBold" pitchFamily="50" charset="-127"/>
+                </a:rPr>
+                <a:t>XX </a:t>
+              </a:r>
+              <a:r>
+                <a:rPr lang="en-US" altLang="ko-KR" sz="1000" dirty="0" err="1" smtClean="0">
+                  <a:solidFill>
+                    <a:schemeClr val="tx1"/>
+                  </a:solidFill>
+                  <a:latin typeface="나눔스퀘어 ExtraBold" pitchFamily="50" charset="-127"/>
+                  <a:ea typeface="나눔스퀘어 ExtraBold" pitchFamily="50" charset="-127"/>
+                </a:rPr>
+                <a:t>ViewModel</a:t>
+              </a:r>
+              <a:endParaRPr lang="ko-KR" altLang="en-US" sz="1000" dirty="0">
+                <a:solidFill>
+                  <a:schemeClr val="tx1"/>
+                </a:solidFill>
+                <a:latin typeface="나눔스퀘어 ExtraBold" pitchFamily="50" charset="-127"/>
+                <a:ea typeface="나눔스퀘어 ExtraBold" pitchFamily="50" charset="-127"/>
+              </a:endParaRPr>
+            </a:p>
+          </p:txBody>
+        </p:sp>
+        <p:sp>
+          <p:nvSpPr>
+            <p:cNvPr id="24" name="TextBox 23"/>
+            <p:cNvSpPr txBox="1"/>
+            <p:nvPr/>
+          </p:nvSpPr>
+          <p:spPr>
+            <a:xfrm>
+              <a:off x="3995936" y="2636912"/>
+              <a:ext cx="1224000" cy="246221"/>
+            </a:xfrm>
+            <a:prstGeom prst="rect">
+              <a:avLst/>
+            </a:prstGeom>
+            <a:solidFill>
+              <a:srgbClr val="60B5CC"/>
+            </a:solidFill>
+            <a:ln w="28575">
+              <a:noFill/>
+            </a:ln>
+          </p:spPr>
+          <p:txBody>
+            <a:bodyPr wrap="square" rtlCol="0">
+              <a:spAutoFit/>
+            </a:bodyPr>
+            <a:lstStyle/>
+            <a:p>
+              <a:pPr algn="ctr"/>
+              <a:r>
+                <a:rPr lang="en-US" altLang="ko-KR" sz="1000" dirty="0" err="1" smtClean="0">
+                  <a:solidFill>
+                    <a:schemeClr val="bg1"/>
+                  </a:solidFill>
+                  <a:latin typeface="나눔스퀘어 Bold" pitchFamily="50" charset="-127"/>
+                  <a:ea typeface="나눔스퀘어 Bold" pitchFamily="50" charset="-127"/>
+                </a:rPr>
+                <a:t>ViewModel</a:t>
+              </a:r>
+              <a:endParaRPr lang="ko-KR" altLang="en-US" sz="1000" dirty="0">
+                <a:solidFill>
+                  <a:schemeClr val="bg1"/>
+                </a:solidFill>
+                <a:latin typeface="나눔스퀘어 Bold" pitchFamily="50" charset="-127"/>
+                <a:ea typeface="나눔스퀘어 Bold" pitchFamily="50" charset="-127"/>
+              </a:endParaRPr>
+            </a:p>
+          </p:txBody>
+        </p:sp>
+        <p:cxnSp>
+          <p:nvCxnSpPr>
+            <p:cNvPr id="25" name="직선 화살표 연결선 24"/>
+            <p:cNvCxnSpPr/>
+            <p:nvPr/>
+          </p:nvCxnSpPr>
+          <p:spPr>
+            <a:xfrm flipV="1">
+              <a:off x="3463408" y="3528885"/>
+              <a:ext cx="396000" cy="0"/>
+            </a:xfrm>
+            <a:prstGeom prst="straightConnector1">
+              <a:avLst/>
+            </a:prstGeom>
+            <a:ln w="38100">
+              <a:solidFill>
+                <a:srgbClr val="60B5CC"/>
+              </a:solidFill>
+              <a:headEnd type="none" w="med" len="med"/>
+              <a:tailEnd type="triangle" w="med" len="med"/>
+            </a:ln>
+          </p:spPr>
+          <p:style>
+            <a:lnRef idx="1">
+              <a:schemeClr val="accent1"/>
+            </a:lnRef>
+            <a:fillRef idx="0">
+              <a:schemeClr val="accent1"/>
+            </a:fillRef>
+            <a:effectRef idx="0">
+              <a:schemeClr val="accent1"/>
+            </a:effectRef>
+            <a:fontRef idx="minor">
+              <a:schemeClr val="tx1"/>
+            </a:fontRef>
+          </p:style>
+        </p:cxnSp>
+        <p:sp>
+          <p:nvSpPr>
+            <p:cNvPr id="26" name="직사각형 25"/>
+            <p:cNvSpPr/>
+            <p:nvPr/>
+          </p:nvSpPr>
+          <p:spPr>
+            <a:xfrm>
+              <a:off x="5940084" y="3384869"/>
+              <a:ext cx="1224136" cy="288032"/>
+            </a:xfrm>
+            <a:prstGeom prst="rect">
+              <a:avLst/>
+            </a:prstGeom>
+            <a:solidFill>
+              <a:schemeClr val="bg1"/>
+            </a:solidFill>
+            <a:ln>
+              <a:solidFill>
+                <a:srgbClr val="60B5CC"/>
+              </a:solidFill>
+            </a:ln>
+          </p:spPr>
+          <p:style>
+            <a:lnRef idx="2">
+              <a:schemeClr val="accent1">
+                <a:shade val="50000"/>
+              </a:schemeClr>
+            </a:lnRef>
+            <a:fillRef idx="1">
+              <a:schemeClr val="accent1"/>
+            </a:fillRef>
+            <a:effectRef idx="0">
+              <a:schemeClr val="accent1"/>
+            </a:effectRef>
+            <a:fontRef idx="minor">
+              <a:schemeClr val="lt1"/>
+            </a:fontRef>
+          </p:style>
+          <p:txBody>
+            <a:bodyPr wrap="none" rtlCol="0" anchor="ctr"/>
+            <a:lstStyle/>
+            <a:p>
+              <a:pPr algn="ctr"/>
+              <a:r>
+                <a:rPr lang="en-US" altLang="ko-KR" sz="900" dirty="0" err="1" smtClean="0">
+                  <a:solidFill>
+                    <a:schemeClr val="tx1"/>
+                  </a:solidFill>
+                  <a:latin typeface="나눔스퀘어 ExtraBold" pitchFamily="50" charset="-127"/>
+                  <a:ea typeface="나눔스퀘어 ExtraBold" pitchFamily="50" charset="-127"/>
+                </a:rPr>
+                <a:t>PurchaseSalesInput</a:t>
+              </a:r>
+              <a:endParaRPr lang="ko-KR" altLang="en-US" sz="900" dirty="0">
+                <a:solidFill>
+                  <a:schemeClr val="tx1"/>
+                </a:solidFill>
+                <a:latin typeface="나눔스퀘어 ExtraBold" pitchFamily="50" charset="-127"/>
+                <a:ea typeface="나눔스퀘어 ExtraBold" pitchFamily="50" charset="-127"/>
+              </a:endParaRPr>
+            </a:p>
+          </p:txBody>
+        </p:sp>
+        <p:sp>
+          <p:nvSpPr>
+            <p:cNvPr id="27" name="TextBox 26"/>
+            <p:cNvSpPr txBox="1"/>
+            <p:nvPr/>
+          </p:nvSpPr>
+          <p:spPr>
+            <a:xfrm>
+              <a:off x="5940152" y="2636912"/>
+              <a:ext cx="1224000" cy="246221"/>
+            </a:xfrm>
+            <a:prstGeom prst="rect">
+              <a:avLst/>
+            </a:prstGeom>
+            <a:solidFill>
+              <a:srgbClr val="60B5CC"/>
+            </a:solidFill>
+            <a:ln w="28575">
+              <a:noFill/>
+            </a:ln>
+          </p:spPr>
+          <p:txBody>
+            <a:bodyPr wrap="square" rtlCol="0">
+              <a:spAutoFit/>
+            </a:bodyPr>
+            <a:lstStyle/>
+            <a:p>
+              <a:pPr algn="ctr"/>
+              <a:r>
+                <a:rPr lang="en-US" altLang="ko-KR" sz="1000" dirty="0" smtClean="0">
+                  <a:solidFill>
+                    <a:schemeClr val="bg1"/>
+                  </a:solidFill>
+                  <a:latin typeface="나눔스퀘어 Bold" pitchFamily="50" charset="-127"/>
+                  <a:ea typeface="나눔스퀘어 Bold" pitchFamily="50" charset="-127"/>
+                </a:rPr>
+                <a:t>View</a:t>
+              </a:r>
+              <a:endParaRPr lang="ko-KR" altLang="en-US" sz="1000" dirty="0">
+                <a:solidFill>
+                  <a:schemeClr val="bg1"/>
+                </a:solidFill>
+                <a:latin typeface="나눔스퀘어 Bold" pitchFamily="50" charset="-127"/>
+                <a:ea typeface="나눔스퀘어 Bold" pitchFamily="50" charset="-127"/>
+              </a:endParaRPr>
+            </a:p>
+          </p:txBody>
+        </p:sp>
+        <p:cxnSp>
+          <p:nvCxnSpPr>
+            <p:cNvPr id="28" name="직선 화살표 연결선 27"/>
+            <p:cNvCxnSpPr/>
+            <p:nvPr/>
+          </p:nvCxnSpPr>
+          <p:spPr>
+            <a:xfrm flipV="1">
+              <a:off x="5407624" y="3528885"/>
+              <a:ext cx="396000" cy="0"/>
+            </a:xfrm>
+            <a:prstGeom prst="straightConnector1">
+              <a:avLst/>
+            </a:prstGeom>
+            <a:ln w="38100">
+              <a:solidFill>
+                <a:srgbClr val="60B5CC"/>
+              </a:solidFill>
+              <a:headEnd type="none" w="med" len="med"/>
+              <a:tailEnd type="triangle" w="med" len="med"/>
+            </a:ln>
+          </p:spPr>
+          <p:style>
+            <a:lnRef idx="1">
+              <a:schemeClr val="accent1"/>
+            </a:lnRef>
+            <a:fillRef idx="0">
+              <a:schemeClr val="accent1"/>
+            </a:fillRef>
+            <a:effectRef idx="0">
+              <a:schemeClr val="accent1"/>
+            </a:effectRef>
+            <a:fontRef idx="minor">
+              <a:schemeClr val="tx1"/>
+            </a:fontRef>
+          </p:style>
+        </p:cxnSp>
+        <p:sp>
+          <p:nvSpPr>
+            <p:cNvPr id="29" name="TextBox 28"/>
+            <p:cNvSpPr txBox="1"/>
+            <p:nvPr/>
+          </p:nvSpPr>
+          <p:spPr>
+            <a:xfrm>
+              <a:off x="3373598" y="3559668"/>
+              <a:ext cx="566181" cy="215444"/>
+            </a:xfrm>
+            <a:prstGeom prst="rect">
+              <a:avLst/>
+            </a:prstGeom>
+            <a:noFill/>
+          </p:spPr>
+          <p:txBody>
+            <a:bodyPr wrap="none" rtlCol="0">
+              <a:spAutoFit/>
+            </a:bodyPr>
+            <a:lstStyle/>
+            <a:p>
+              <a:r>
+                <a:rPr lang="en-US" altLang="ko-KR" sz="800" dirty="0" smtClean="0">
+                  <a:solidFill>
+                    <a:srgbClr val="FF0000"/>
+                  </a:solidFill>
+                  <a:latin typeface="나눔스퀘어 ExtraBold" pitchFamily="50" charset="-127"/>
+                  <a:ea typeface="나눔스퀘어 ExtraBold" pitchFamily="50" charset="-127"/>
+                </a:rPr>
+                <a:t>Trading</a:t>
+              </a:r>
+              <a:endParaRPr lang="ko-KR" altLang="en-US" sz="800" dirty="0">
+                <a:solidFill>
+                  <a:srgbClr val="FF0000"/>
+                </a:solidFill>
+                <a:latin typeface="나눔스퀘어 ExtraBold" pitchFamily="50" charset="-127"/>
+                <a:ea typeface="나눔스퀘어 ExtraBold" pitchFamily="50" charset="-127"/>
+              </a:endParaRPr>
+            </a:p>
+          </p:txBody>
+        </p:sp>
+        <p:sp>
+          <p:nvSpPr>
+            <p:cNvPr id="30" name="TextBox 29"/>
+            <p:cNvSpPr txBox="1"/>
+            <p:nvPr/>
+          </p:nvSpPr>
+          <p:spPr>
+            <a:xfrm>
+              <a:off x="5322587" y="3559668"/>
+              <a:ext cx="562975" cy="215444"/>
+            </a:xfrm>
+            <a:prstGeom prst="rect">
+              <a:avLst/>
+            </a:prstGeom>
+            <a:noFill/>
+          </p:spPr>
+          <p:txBody>
+            <a:bodyPr wrap="none" rtlCol="0">
+              <a:spAutoFit/>
+            </a:bodyPr>
+            <a:lstStyle/>
+            <a:p>
+              <a:r>
+                <a:rPr lang="en-US" altLang="ko-KR" sz="800" dirty="0" smtClean="0">
+                  <a:solidFill>
+                    <a:schemeClr val="bg1">
+                      <a:lumMod val="50000"/>
+                    </a:schemeClr>
+                  </a:solidFill>
+                  <a:latin typeface="나눔스퀘어 ExtraBold" pitchFamily="50" charset="-127"/>
+                  <a:ea typeface="나눔스퀘어 ExtraBold" pitchFamily="50" charset="-127"/>
+                </a:rPr>
+                <a:t>Binding</a:t>
+              </a:r>
+              <a:endParaRPr lang="ko-KR" altLang="en-US" sz="800" dirty="0">
+                <a:solidFill>
+                  <a:schemeClr val="bg1">
+                    <a:lumMod val="50000"/>
+                  </a:schemeClr>
+                </a:solidFill>
+                <a:latin typeface="나눔스퀘어 ExtraBold" pitchFamily="50" charset="-127"/>
+                <a:ea typeface="나눔스퀘어 ExtraBold" pitchFamily="50" charset="-127"/>
+              </a:endParaRPr>
+            </a:p>
+          </p:txBody>
+        </p:sp>
+      </p:grpSp>
+      <p:cxnSp>
+        <p:nvCxnSpPr>
+          <p:cNvPr id="33" name="직선 연결선 32"/>
+          <p:cNvCxnSpPr/>
+          <p:nvPr/>
+        </p:nvCxnSpPr>
+        <p:spPr>
+          <a:xfrm>
+            <a:off x="179512" y="1916832"/>
+            <a:ext cx="8784976" cy="0"/>
+          </a:xfrm>
+          <a:prstGeom prst="line">
+            <a:avLst/>
+          </a:prstGeom>
+          <a:ln w="38100">
+            <a:solidFill>
+              <a:schemeClr val="bg1">
+                <a:lumMod val="85000"/>
+              </a:schemeClr>
+            </a:solidFill>
+          </a:ln>
+        </p:spPr>
+        <p:style>
+          <a:lnRef idx="1">
+            <a:schemeClr val="accent1"/>
+          </a:lnRef>
+          <a:fillRef idx="0">
+            <a:schemeClr val="accent1"/>
+          </a:fillRef>
+          <a:effectRef idx="0">
+            <a:schemeClr val="accent1"/>
+          </a:effectRef>
+          <a:fontRef idx="minor">
+            <a:schemeClr val="tx1"/>
+          </a:fontRef>
+        </p:style>
+      </p:cxnSp>
+      <p:sp>
+        <p:nvSpPr>
+          <p:cNvPr id="35" name="TextBox 34"/>
+          <p:cNvSpPr txBox="1"/>
+          <p:nvPr/>
+        </p:nvSpPr>
+        <p:spPr>
+          <a:xfrm>
+            <a:off x="5514073" y="256277"/>
+            <a:ext cx="3234392" cy="1293850"/>
+          </a:xfrm>
+          <a:prstGeom prst="rect">
+            <a:avLst/>
+          </a:prstGeom>
+          <a:noFill/>
+          <a:ln w="28575">
+            <a:solidFill>
+              <a:srgbClr val="FF0000"/>
+            </a:solidFill>
+          </a:ln>
+        </p:spPr>
+        <p:txBody>
+          <a:bodyPr wrap="none" rtlCol="0" anchor="ctr">
+            <a:noAutofit/>
+          </a:bodyPr>
+          <a:lstStyle/>
+          <a:p>
+            <a:pPr algn="ctr"/>
+            <a:endParaRPr lang="en-US" altLang="ko-KR" sz="1600" dirty="0" smtClean="0">
+              <a:solidFill>
+                <a:srgbClr val="FF0000"/>
+              </a:solidFill>
+              <a:latin typeface="나눔스퀘어 Bold" pitchFamily="50" charset="-127"/>
+              <a:ea typeface="나눔스퀘어 Bold" pitchFamily="50" charset="-127"/>
+            </a:endParaRPr>
+          </a:p>
+          <a:p>
+            <a:pPr algn="ctr"/>
+            <a:r>
+              <a:rPr lang="en-US" altLang="ko-KR" sz="1600" dirty="0" err="1" smtClean="0">
+                <a:solidFill>
+                  <a:srgbClr val="FF0000"/>
+                </a:solidFill>
+                <a:latin typeface="나눔스퀘어 Bold" pitchFamily="50" charset="-127"/>
+                <a:ea typeface="나눔스퀘어 Bold" pitchFamily="50" charset="-127"/>
+              </a:rPr>
+              <a:t>UserControl</a:t>
+            </a:r>
+            <a:r>
+              <a:rPr lang="ko-KR" altLang="en-US" sz="1600" dirty="0" smtClean="0">
+                <a:solidFill>
+                  <a:srgbClr val="FF0000"/>
+                </a:solidFill>
+                <a:latin typeface="나눔스퀘어 Bold" pitchFamily="50" charset="-127"/>
+                <a:ea typeface="나눔스퀘어 Bold" pitchFamily="50" charset="-127"/>
+              </a:rPr>
+              <a:t>로 </a:t>
+            </a:r>
+            <a:r>
+              <a:rPr lang="ko-KR" altLang="en-US" sz="1600" dirty="0" err="1" smtClean="0">
+                <a:solidFill>
+                  <a:srgbClr val="FF0000"/>
+                </a:solidFill>
+                <a:latin typeface="나눔스퀘어 Bold" pitchFamily="50" charset="-127"/>
+                <a:ea typeface="나눔스퀘어 Bold" pitchFamily="50" charset="-127"/>
+              </a:rPr>
+              <a:t>만들게되면서</a:t>
+            </a:r>
+            <a:r>
+              <a:rPr lang="ko-KR" altLang="en-US" sz="1600" dirty="0" smtClean="0">
+                <a:solidFill>
+                  <a:srgbClr val="FF0000"/>
+                </a:solidFill>
+                <a:latin typeface="나눔스퀘어 Bold" pitchFamily="50" charset="-127"/>
+                <a:ea typeface="나눔스퀘어 Bold" pitchFamily="50" charset="-127"/>
+              </a:rPr>
+              <a:t> </a:t>
+            </a:r>
+            <a:endParaRPr lang="en-US" altLang="ko-KR" sz="1600" dirty="0" smtClean="0">
+              <a:solidFill>
+                <a:srgbClr val="FF0000"/>
+              </a:solidFill>
+              <a:latin typeface="나눔스퀘어 Bold" pitchFamily="50" charset="-127"/>
+              <a:ea typeface="나눔스퀘어 Bold" pitchFamily="50" charset="-127"/>
+            </a:endParaRPr>
+          </a:p>
+          <a:p>
+            <a:pPr algn="ctr"/>
+            <a:r>
+              <a:rPr lang="en-US" altLang="ko-KR" sz="1600" dirty="0" err="1" smtClean="0">
+                <a:solidFill>
+                  <a:srgbClr val="FF0000"/>
+                </a:solidFill>
+                <a:latin typeface="나눔스퀘어 Bold" pitchFamily="50" charset="-127"/>
+                <a:ea typeface="나눔스퀘어 Bold" pitchFamily="50" charset="-127"/>
+              </a:rPr>
+              <a:t>ViewModel</a:t>
+            </a:r>
+            <a:r>
+              <a:rPr lang="ko-KR" altLang="en-US" sz="1600" dirty="0" smtClean="0">
+                <a:solidFill>
+                  <a:srgbClr val="FF0000"/>
+                </a:solidFill>
+                <a:latin typeface="나눔스퀘어 Bold" pitchFamily="50" charset="-127"/>
+                <a:ea typeface="나눔스퀘어 Bold" pitchFamily="50" charset="-127"/>
+              </a:rPr>
+              <a:t>의 </a:t>
+            </a:r>
+            <a:r>
+              <a:rPr lang="en-US" altLang="ko-KR" sz="1600" dirty="0" smtClean="0">
+                <a:solidFill>
+                  <a:srgbClr val="FF0000"/>
+                </a:solidFill>
+                <a:latin typeface="나눔스퀘어 Bold" pitchFamily="50" charset="-127"/>
+                <a:ea typeface="나눔스퀘어 Bold" pitchFamily="50" charset="-127"/>
+              </a:rPr>
+              <a:t>Data</a:t>
+            </a:r>
+            <a:r>
+              <a:rPr lang="ko-KR" altLang="en-US" sz="1600" dirty="0" smtClean="0">
+                <a:solidFill>
+                  <a:srgbClr val="FF0000"/>
+                </a:solidFill>
+                <a:latin typeface="나눔스퀘어 Bold" pitchFamily="50" charset="-127"/>
+                <a:ea typeface="나눔스퀘어 Bold" pitchFamily="50" charset="-127"/>
+              </a:rPr>
+              <a:t>를 </a:t>
+            </a:r>
+            <a:endParaRPr lang="en-US" altLang="ko-KR" sz="1600" dirty="0" smtClean="0">
+              <a:solidFill>
+                <a:srgbClr val="FF0000"/>
+              </a:solidFill>
+              <a:latin typeface="나눔스퀘어 Bold" pitchFamily="50" charset="-127"/>
+              <a:ea typeface="나눔스퀘어 Bold" pitchFamily="50" charset="-127"/>
+            </a:endParaRPr>
+          </a:p>
+          <a:p>
+            <a:pPr algn="ctr"/>
+            <a:r>
+              <a:rPr lang="en-US" altLang="ko-KR" sz="1600" dirty="0" smtClean="0">
+                <a:solidFill>
+                  <a:srgbClr val="FF0000"/>
+                </a:solidFill>
+                <a:latin typeface="나눔스퀘어 Bold" pitchFamily="50" charset="-127"/>
+                <a:ea typeface="나눔스퀘어 Bold" pitchFamily="50" charset="-127"/>
+              </a:rPr>
+              <a:t>Binding </a:t>
+            </a:r>
+            <a:r>
+              <a:rPr lang="ko-KR" altLang="en-US" sz="1600" dirty="0" smtClean="0">
+                <a:solidFill>
+                  <a:srgbClr val="FF0000"/>
+                </a:solidFill>
+                <a:latin typeface="나눔스퀘어 Bold" pitchFamily="50" charset="-127"/>
+                <a:ea typeface="나눔스퀘어 Bold" pitchFamily="50" charset="-127"/>
+              </a:rPr>
+              <a:t>하기가 </a:t>
+            </a:r>
+            <a:r>
+              <a:rPr lang="ko-KR" altLang="en-US" sz="1600" dirty="0" err="1" smtClean="0">
+                <a:solidFill>
+                  <a:srgbClr val="FF0000"/>
+                </a:solidFill>
+                <a:latin typeface="나눔스퀘어 Bold" pitchFamily="50" charset="-127"/>
+                <a:ea typeface="나눔스퀘어 Bold" pitchFamily="50" charset="-127"/>
+              </a:rPr>
+              <a:t>쉽지않음</a:t>
+            </a:r>
+            <a:r>
+              <a:rPr lang="en-US" altLang="ko-KR" sz="1600" dirty="0" smtClean="0">
+                <a:solidFill>
+                  <a:srgbClr val="FF0000"/>
+                </a:solidFill>
+                <a:latin typeface="나눔스퀘어 Bold" pitchFamily="50" charset="-127"/>
+                <a:ea typeface="나눔스퀘어 Bold" pitchFamily="50" charset="-127"/>
+              </a:rPr>
+              <a:t>.</a:t>
+            </a:r>
+            <a:endParaRPr lang="ko-KR" altLang="en-US" sz="1600" dirty="0">
+              <a:solidFill>
+                <a:srgbClr val="FF0000"/>
+              </a:solidFill>
+              <a:latin typeface="나눔스퀘어 Bold" pitchFamily="50" charset="-127"/>
+              <a:ea typeface="나눔스퀘어 Bold" pitchFamily="50" charset="-127"/>
+            </a:endParaRPr>
+          </a:p>
+        </p:txBody>
+      </p:sp>
+      <p:sp>
+        <p:nvSpPr>
+          <p:cNvPr id="36" name="TextBox 35"/>
+          <p:cNvSpPr txBox="1"/>
+          <p:nvPr/>
+        </p:nvSpPr>
+        <p:spPr>
+          <a:xfrm>
+            <a:off x="5514073" y="260648"/>
+            <a:ext cx="3234392" cy="288032"/>
+          </a:xfrm>
+          <a:prstGeom prst="rect">
+            <a:avLst/>
+          </a:prstGeom>
+          <a:solidFill>
+            <a:srgbClr val="FF0000"/>
+          </a:solidFill>
+          <a:ln w="28575">
+            <a:solidFill>
+              <a:srgbClr val="FF0000"/>
+            </a:solidFill>
+          </a:ln>
+        </p:spPr>
+        <p:txBody>
+          <a:bodyPr wrap="none" rtlCol="0" anchor="ctr">
+            <a:noAutofit/>
+          </a:bodyPr>
+          <a:lstStyle/>
+          <a:p>
+            <a:pPr algn="ctr"/>
+            <a:r>
+              <a:rPr lang="ko-KR" altLang="en-US" sz="1600" dirty="0" smtClean="0">
+                <a:solidFill>
+                  <a:schemeClr val="bg1"/>
+                </a:solidFill>
+                <a:latin typeface="나눔스퀘어 Bold" pitchFamily="50" charset="-127"/>
+                <a:ea typeface="나눔스퀘어 Bold" pitchFamily="50" charset="-127"/>
+              </a:rPr>
+              <a:t>문제</a:t>
+            </a:r>
+            <a:r>
+              <a:rPr lang="ko-KR" altLang="en-US" sz="1600" dirty="0" smtClean="0">
+                <a:solidFill>
+                  <a:schemeClr val="bg1"/>
+                </a:solidFill>
+                <a:latin typeface="나눔스퀘어 Bold" pitchFamily="50" charset="-127"/>
+                <a:ea typeface="나눔스퀘어 Bold" pitchFamily="50" charset="-127"/>
+              </a:rPr>
+              <a:t>점</a:t>
+            </a:r>
+            <a:endParaRPr lang="en-US" altLang="ko-KR" sz="1600" dirty="0" smtClean="0">
+              <a:solidFill>
+                <a:schemeClr val="bg1"/>
+              </a:solidFill>
+              <a:latin typeface="나눔스퀘어 Bold" pitchFamily="50" charset="-127"/>
+              <a:ea typeface="나눔스퀘어 Bold" pitchFamily="50" charset="-127"/>
+            </a:endParaRPr>
+          </a:p>
+        </p:txBody>
+      </p:sp>
+      <p:cxnSp>
+        <p:nvCxnSpPr>
+          <p:cNvPr id="39" name="직선 화살표 연결선 38"/>
+          <p:cNvCxnSpPr>
+            <a:stCxn id="29" idx="2"/>
+          </p:cNvCxnSpPr>
+          <p:nvPr/>
+        </p:nvCxnSpPr>
+        <p:spPr>
+          <a:xfrm flipH="1">
+            <a:off x="4499992" y="3300088"/>
+            <a:ext cx="12309" cy="632968"/>
+          </a:xfrm>
+          <a:prstGeom prst="straightConnector1">
+            <a:avLst/>
+          </a:prstGeom>
+          <a:ln w="19050">
+            <a:solidFill>
+              <a:srgbClr val="FF0000"/>
+            </a:solidFill>
+            <a:prstDash val="sysDot"/>
+            <a:headEnd type="none" w="med" len="med"/>
+            <a:tailEnd type="triangle" w="med" len="med"/>
+          </a:ln>
+        </p:spPr>
+        <p:style>
+          <a:lnRef idx="1">
+            <a:schemeClr val="accent1"/>
+          </a:lnRef>
+          <a:fillRef idx="0">
+            <a:schemeClr val="accent1"/>
+          </a:fillRef>
+          <a:effectRef idx="0">
+            <a:schemeClr val="accent1"/>
+          </a:effectRef>
+          <a:fontRef idx="minor">
+            <a:schemeClr val="tx1"/>
+          </a:fontRef>
+        </p:style>
+      </p:cxnSp>
+      <p:sp>
+        <p:nvSpPr>
+          <p:cNvPr id="40" name="TextBox 39"/>
+          <p:cNvSpPr txBox="1"/>
+          <p:nvPr/>
+        </p:nvSpPr>
+        <p:spPr>
+          <a:xfrm>
+            <a:off x="1187624" y="4221088"/>
+            <a:ext cx="7220246" cy="923330"/>
+          </a:xfrm>
+          <a:prstGeom prst="rect">
+            <a:avLst/>
+          </a:prstGeom>
+          <a:noFill/>
+        </p:spPr>
+        <p:txBody>
+          <a:bodyPr wrap="none" rtlCol="0">
+            <a:spAutoFit/>
+          </a:bodyPr>
+          <a:lstStyle/>
+          <a:p>
+            <a:r>
+              <a:rPr lang="en-US" altLang="ko-KR" dirty="0" smtClean="0"/>
+              <a:t>Trading </a:t>
+            </a:r>
+            <a:r>
+              <a:rPr lang="ko-KR" altLang="en-US" dirty="0" smtClean="0"/>
+              <a:t>대신에 </a:t>
+            </a:r>
+            <a:r>
+              <a:rPr lang="en-US" altLang="ko-KR" dirty="0" smtClean="0"/>
+              <a:t>User Control </a:t>
+            </a:r>
+            <a:r>
+              <a:rPr lang="ko-KR" altLang="en-US" dirty="0" smtClean="0"/>
+              <a:t>에서 필요로 하는</a:t>
+            </a:r>
+            <a:endParaRPr lang="en-US" altLang="ko-KR" dirty="0" smtClean="0"/>
+          </a:p>
+          <a:p>
+            <a:r>
+              <a:rPr lang="ko-KR" altLang="en-US" dirty="0" smtClean="0"/>
+              <a:t>다섯 가지 데이터</a:t>
+            </a:r>
+            <a:r>
+              <a:rPr lang="ko-KR" altLang="en-US" dirty="0" smtClean="0"/>
+              <a:t>를</a:t>
+            </a:r>
+            <a:r>
+              <a:rPr lang="ko-KR" altLang="en-US" dirty="0" smtClean="0"/>
+              <a:t> 필드로 가지는 클래스의 </a:t>
+            </a:r>
+            <a:r>
+              <a:rPr lang="ko-KR" altLang="en-US" dirty="0" err="1" smtClean="0"/>
+              <a:t>인스턴스를</a:t>
+            </a:r>
+            <a:r>
+              <a:rPr lang="ko-KR" altLang="en-US" dirty="0" smtClean="0"/>
+              <a:t> 넘겨준다면</a:t>
+            </a:r>
+            <a:endParaRPr lang="en-US" altLang="ko-KR" dirty="0" smtClean="0"/>
+          </a:p>
+          <a:p>
+            <a:r>
+              <a:rPr lang="en-US" altLang="ko-KR" dirty="0" smtClean="0"/>
+              <a:t>User Control</a:t>
+            </a:r>
+            <a:r>
+              <a:rPr lang="ko-KR" altLang="en-US" dirty="0" smtClean="0"/>
+              <a:t>의 종속성 속성으로 해당 클래스 타입을 </a:t>
+            </a:r>
+            <a:endParaRPr lang="ko-KR" altLang="en-US" dirty="0"/>
+          </a:p>
+        </p:txBody>
+      </p:sp>
+    </p:spTree>
+  </p:cSld>
+  <p:clrMapOvr>
+    <a:masterClrMapping/>
+  </p:clrMapOvr>
+</p:sld>
+</file>
+
+<file path=ppt/slides/slide5.xml><?xml version="1.0" encoding="utf-8"?>
+<p:sld xmlns:a="http://schemas.openxmlformats.org/drawingml/2006/main" xmlns:r="http://schemas.openxmlformats.org/officeDocument/2006/relationships" xmlns:p="http://schemas.openxmlformats.org/presentationml/2006/main">
+  <p:cSld>
     <p:bg>
       <p:bgPr>
         <a:solidFill>
@@ -16235,4 +18236,287 @@
   <a:objectDefaults/>
   <a:extraClrSchemeLst/>
 </a:theme>
+</file>
+
+<file path=ppt/theme/theme2.xml><?xml version="1.0" encoding="utf-8"?>
+<a:theme xmlns:a="http://schemas.openxmlformats.org/drawingml/2006/main" name="Office 테마">
+  <a:themeElements>
+    <a:clrScheme name="Office">
+      <a:dk1>
+        <a:sysClr val="windowText" lastClr="000000"/>
+      </a:dk1>
+      <a:lt1>
+        <a:sysClr val="window" lastClr="FFFFFF"/>
+      </a:lt1>
+      <a:dk2>
+        <a:srgbClr val="1F497D"/>
+      </a:dk2>
+      <a:lt2>
+        <a:srgbClr val="EEECE1"/>
+      </a:lt2>
+      <a:accent1>
+        <a:srgbClr val="4F81BD"/>
+      </a:accent1>
+      <a:accent2>
+        <a:srgbClr val="C0504D"/>
+      </a:accent2>
+      <a:accent3>
+        <a:srgbClr val="9BBB59"/>
+      </a:accent3>
+      <a:accent4>
+        <a:srgbClr val="8064A2"/>
+      </a:accent4>
+      <a:accent5>
+        <a:srgbClr val="4BACC6"/>
+      </a:accent5>
+      <a:accent6>
+        <a:srgbClr val="F79646"/>
+      </a:accent6>
+      <a:hlink>
+        <a:srgbClr val="0000FF"/>
+      </a:hlink>
+      <a:folHlink>
+        <a:srgbClr val="800080"/>
+      </a:folHlink>
+    </a:clrScheme>
+    <a:fontScheme name="Office">
+      <a:majorFont>
+        <a:latin typeface="맑은 고딕"/>
+        <a:ea typeface=""/>
+        <a:cs typeface=""/>
+        <a:font script="Jpan" typeface="ＭＳ Ｐゴシック"/>
+        <a:font script="Hang" typeface="맑은 고딕"/>
+        <a:font script="Hans" typeface="宋体"/>
+        <a:font script="Hant" typeface="新細明體"/>
+        <a:font script="Arab" typeface="Times New Roman"/>
+        <a:font script="Hebr" typeface="Times New Roman"/>
+        <a:font script="Thai" typeface="Angsana New"/>
+        <a:font script="Ethi" typeface="Nyala"/>
+        <a:font script="Beng" typeface="Vrinda"/>
+        <a:font script="Gujr" typeface="Shruti"/>
+        <a:font script="Khmr" typeface="MoolBoran"/>
+        <a:font script="Knda" typeface="Tunga"/>
+        <a:font script="Guru" typeface="Raavi"/>
+        <a:font script="Cans" typeface="Euphemia"/>
+        <a:font script="Cher" typeface="Plantagenet Cherokee"/>
+        <a:font script="Yiii" typeface="Microsoft Yi Baiti"/>
+        <a:font script="Tibt" typeface="Microsoft Himalaya"/>
+        <a:font script="Thaa" typeface="MV Boli"/>
+        <a:font script="Deva" typeface="Mangal"/>
+        <a:font script="Telu" typeface="Gautami"/>
+        <a:font script="Taml" typeface="Latha"/>
+        <a:font script="Syrc" typeface="Estrangelo Edessa"/>
+        <a:font script="Orya" typeface="Kalinga"/>
+        <a:font script="Mlym" typeface="Kartika"/>
+        <a:font script="Laoo" typeface="DokChampa"/>
+        <a:font script="Sinh" typeface="Iskoola Pota"/>
+        <a:font script="Mong" typeface="Mongolian Baiti"/>
+        <a:font script="Viet" typeface="Times New Roman"/>
+        <a:font script="Uigh" typeface="Microsoft Uighur"/>
+      </a:majorFont>
+      <a:minorFont>
+        <a:latin typeface="맑은 고딕"/>
+        <a:ea typeface=""/>
+        <a:cs typeface=""/>
+        <a:font script="Jpan" typeface="ＭＳ Ｐゴシック"/>
+        <a:font script="Hang" typeface="맑은 고딕"/>
+        <a:font script="Hans" typeface="宋体"/>
+        <a:font script="Hant" typeface="新細明體"/>
+        <a:font script="Arab" typeface="Arial"/>
+        <a:font script="Hebr" typeface="Arial"/>
+        <a:font script="Thai" typeface="Cordia New"/>
+        <a:font script="Ethi" typeface="Nyala"/>
+        <a:font script="Beng" typeface="Vrinda"/>
+        <a:font script="Gujr" typeface="Shruti"/>
+        <a:font script="Khmr" typeface="DaunPenh"/>
+        <a:font script="Knda" typeface="Tunga"/>
+        <a:font script="Guru" typeface="Raavi"/>
+        <a:font script="Cans" typeface="Euphemia"/>
+        <a:font script="Cher" typeface="Plantagenet Cherokee"/>
+        <a:font script="Yiii" typeface="Microsoft Yi Baiti"/>
+        <a:font script="Tibt" typeface="Microsoft Himalaya"/>
+        <a:font script="Thaa" typeface="MV Boli"/>
+        <a:font script="Deva" typeface="Mangal"/>
+        <a:font script="Telu" typeface="Gautami"/>
+        <a:font script="Taml" typeface="Latha"/>
+        <a:font script="Syrc" typeface="Estrangelo Edessa"/>
+        <a:font script="Orya" typeface="Kalinga"/>
+        <a:font script="Mlym" typeface="Kartika"/>
+        <a:font script="Laoo" typeface="DokChampa"/>
+        <a:font script="Sinh" typeface="Iskoola Pota"/>
+        <a:font script="Mong" typeface="Mongolian Baiti"/>
+        <a:font script="Viet" typeface="Arial"/>
+        <a:font script="Uigh" typeface="Microsoft Uighur"/>
+      </a:minorFont>
+    </a:fontScheme>
+    <a:fmtScheme name="Office">
+      <a:fillStyleLst>
+        <a:solidFill>
+          <a:schemeClr val="phClr"/>
+        </a:solidFill>
+        <a:gradFill rotWithShape="1">
+          <a:gsLst>
+            <a:gs pos="0">
+              <a:schemeClr val="phClr">
+                <a:tint val="50000"/>
+                <a:satMod val="300000"/>
+              </a:schemeClr>
+            </a:gs>
+            <a:gs pos="35000">
+              <a:schemeClr val="phClr">
+                <a:tint val="37000"/>
+                <a:satMod val="300000"/>
+              </a:schemeClr>
+            </a:gs>
+            <a:gs pos="100000">
+              <a:schemeClr val="phClr">
+                <a:tint val="15000"/>
+                <a:satMod val="350000"/>
+              </a:schemeClr>
+            </a:gs>
+          </a:gsLst>
+          <a:lin ang="16200000" scaled="1"/>
+        </a:gradFill>
+        <a:gradFill rotWithShape="1">
+          <a:gsLst>
+            <a:gs pos="0">
+              <a:schemeClr val="phClr">
+                <a:shade val="51000"/>
+                <a:satMod val="130000"/>
+              </a:schemeClr>
+            </a:gs>
+            <a:gs pos="80000">
+              <a:schemeClr val="phClr">
+                <a:shade val="93000"/>
+                <a:satMod val="130000"/>
+              </a:schemeClr>
+            </a:gs>
+            <a:gs pos="100000">
+              <a:schemeClr val="phClr">
+                <a:shade val="94000"/>
+                <a:satMod val="135000"/>
+              </a:schemeClr>
+            </a:gs>
+          </a:gsLst>
+          <a:lin ang="16200000" scaled="0"/>
+        </a:gradFill>
+      </a:fillStyleLst>
+      <a:lnStyleLst>
+        <a:ln w="9525" cap="flat" cmpd="sng" algn="ctr">
+          <a:solidFill>
+            <a:schemeClr val="phClr">
+              <a:shade val="95000"/>
+              <a:satMod val="105000"/>
+            </a:schemeClr>
+          </a:solidFill>
+          <a:prstDash val="solid"/>
+        </a:ln>
+        <a:ln w="25400" cap="flat" cmpd="sng" algn="ctr">
+          <a:solidFill>
+            <a:schemeClr val="phClr"/>
+          </a:solidFill>
+          <a:prstDash val="solid"/>
+        </a:ln>
+        <a:ln w="38100" cap="flat" cmpd="sng" algn="ctr">
+          <a:solidFill>
+            <a:schemeClr val="phClr"/>
+          </a:solidFill>
+          <a:prstDash val="solid"/>
+        </a:ln>
+      </a:lnStyleLst>
+      <a:effectStyleLst>
+        <a:effectStyle>
+          <a:effectLst>
+            <a:outerShdw blurRad="40000" dist="20000" dir="5400000" rotWithShape="0">
+              <a:srgbClr val="000000">
+                <a:alpha val="38000"/>
+              </a:srgbClr>
+            </a:outerShdw>
+          </a:effectLst>
+        </a:effectStyle>
+        <a:effectStyle>
+          <a:effectLst>
+            <a:outerShdw blurRad="40000" dist="23000" dir="5400000" rotWithShape="0">
+              <a:srgbClr val="000000">
+                <a:alpha val="35000"/>
+              </a:srgbClr>
+            </a:outerShdw>
+          </a:effectLst>
+        </a:effectStyle>
+        <a:effectStyle>
+          <a:effectLst>
+            <a:outerShdw blurRad="40000" dist="23000" dir="5400000" rotWithShape="0">
+              <a:srgbClr val="000000">
+                <a:alpha val="35000"/>
+              </a:srgbClr>
+            </a:outerShdw>
+          </a:effectLst>
+          <a:scene3d>
+            <a:camera prst="orthographicFront">
+              <a:rot lat="0" lon="0" rev="0"/>
+            </a:camera>
+            <a:lightRig rig="threePt" dir="t">
+              <a:rot lat="0" lon="0" rev="1200000"/>
+            </a:lightRig>
+          </a:scene3d>
+          <a:sp3d>
+            <a:bevelT w="63500" h="25400"/>
+          </a:sp3d>
+        </a:effectStyle>
+      </a:effectStyleLst>
+      <a:bgFillStyleLst>
+        <a:solidFill>
+          <a:schemeClr val="phClr"/>
+        </a:solidFill>
+        <a:gradFill rotWithShape="1">
+          <a:gsLst>
+            <a:gs pos="0">
+              <a:schemeClr val="phClr">
+                <a:tint val="40000"/>
+                <a:satMod val="350000"/>
+              </a:schemeClr>
+            </a:gs>
+            <a:gs pos="40000">
+              <a:schemeClr val="phClr">
+                <a:tint val="45000"/>
+                <a:shade val="99000"/>
+                <a:satMod val="350000"/>
+              </a:schemeClr>
+            </a:gs>
+            <a:gs pos="100000">
+              <a:schemeClr val="phClr">
+                <a:shade val="20000"/>
+                <a:satMod val="255000"/>
+              </a:schemeClr>
+            </a:gs>
+          </a:gsLst>
+          <a:path path="circle">
+            <a:fillToRect l="50000" t="-80000" r="50000" b="180000"/>
+          </a:path>
+        </a:gradFill>
+        <a:gradFill rotWithShape="1">
+          <a:gsLst>
+            <a:gs pos="0">
+              <a:schemeClr val="phClr">
+                <a:tint val="80000"/>
+                <a:satMod val="300000"/>
+              </a:schemeClr>
+            </a:gs>
+            <a:gs pos="100000">
+              <a:schemeClr val="phClr">
+                <a:shade val="30000"/>
+                <a:satMod val="200000"/>
+              </a:schemeClr>
+            </a:gs>
+          </a:gsLst>
+          <a:path path="circle">
+            <a:fillToRect l="50000" t="50000" r="50000" b="50000"/>
+          </a:path>
+        </a:gradFill>
+      </a:bgFillStyleLst>
+    </a:fmtScheme>
+  </a:themeElements>
+  <a:objectDefaults/>
+  <a:extraClrSchemeLst/>
+</a:theme>
 </file>
</xml_diff>